<commit_message>
update UI for splash page, main list page and detail page.
</commit_message>
<xml_diff>
--- a/bg-template.pptx
+++ b/bg-template.pptx
@@ -6,6 +6,7 @@
   </p:sldMasterIdLst>
   <p:sldIdLst>
     <p:sldId id="257" r:id="rId2"/>
+    <p:sldId id="258" r:id="rId3"/>
   </p:sldIdLst>
   <p:sldSz cx="9144000" cy="6858000" type="screen4x3"/>
   <p:notesSz cx="6858000" cy="9144000"/>
@@ -288,7 +289,8 @@
           <a:p>
             <a:fld id="{73FC10DC-F744-4F62-ACA5-274CC8B19AAC}" type="datetimeFigureOut">
               <a:rPr lang="zh-CN" altLang="en-US" smtClean="0"/>
-              <a:t>2013-01-02</a:t>
+              <a:pPr/>
+              <a:t>2013/1/4</a:t>
             </a:fld>
             <a:endParaRPr lang="zh-CN" altLang="en-US"/>
           </a:p>
@@ -330,6 +332,7 @@
           <a:p>
             <a:fld id="{CDA17B46-3DC4-493C-B532-1D5B3F1A111B}" type="slidenum">
               <a:rPr lang="zh-CN" altLang="en-US" smtClean="0"/>
+              <a:pPr/>
               <a:t>‹#›</a:t>
             </a:fld>
             <a:endParaRPr lang="zh-CN" altLang="en-US"/>
@@ -453,7 +456,8 @@
           <a:p>
             <a:fld id="{73FC10DC-F744-4F62-ACA5-274CC8B19AAC}" type="datetimeFigureOut">
               <a:rPr lang="zh-CN" altLang="en-US" smtClean="0"/>
-              <a:t>2013-01-02</a:t>
+              <a:pPr/>
+              <a:t>2013/1/4</a:t>
             </a:fld>
             <a:endParaRPr lang="zh-CN" altLang="en-US"/>
           </a:p>
@@ -495,6 +499,7 @@
           <a:p>
             <a:fld id="{CDA17B46-3DC4-493C-B532-1D5B3F1A111B}" type="slidenum">
               <a:rPr lang="zh-CN" altLang="en-US" smtClean="0"/>
+              <a:pPr/>
               <a:t>‹#›</a:t>
             </a:fld>
             <a:endParaRPr lang="zh-CN" altLang="en-US"/>
@@ -628,7 +633,8 @@
           <a:p>
             <a:fld id="{73FC10DC-F744-4F62-ACA5-274CC8B19AAC}" type="datetimeFigureOut">
               <a:rPr lang="zh-CN" altLang="en-US" smtClean="0"/>
-              <a:t>2013-01-02</a:t>
+              <a:pPr/>
+              <a:t>2013/1/4</a:t>
             </a:fld>
             <a:endParaRPr lang="zh-CN" altLang="en-US"/>
           </a:p>
@@ -670,6 +676,7 @@
           <a:p>
             <a:fld id="{CDA17B46-3DC4-493C-B532-1D5B3F1A111B}" type="slidenum">
               <a:rPr lang="zh-CN" altLang="en-US" smtClean="0"/>
+              <a:pPr/>
               <a:t>‹#›</a:t>
             </a:fld>
             <a:endParaRPr lang="zh-CN" altLang="en-US"/>
@@ -793,7 +800,8 @@
           <a:p>
             <a:fld id="{73FC10DC-F744-4F62-ACA5-274CC8B19AAC}" type="datetimeFigureOut">
               <a:rPr lang="zh-CN" altLang="en-US" smtClean="0"/>
-              <a:t>2013-01-02</a:t>
+              <a:pPr/>
+              <a:t>2013/1/4</a:t>
             </a:fld>
             <a:endParaRPr lang="zh-CN" altLang="en-US"/>
           </a:p>
@@ -835,6 +843,7 @@
           <a:p>
             <a:fld id="{CDA17B46-3DC4-493C-B532-1D5B3F1A111B}" type="slidenum">
               <a:rPr lang="zh-CN" altLang="en-US" smtClean="0"/>
+              <a:pPr/>
               <a:t>‹#›</a:t>
             </a:fld>
             <a:endParaRPr lang="zh-CN" altLang="en-US"/>
@@ -1034,7 +1043,8 @@
           <a:p>
             <a:fld id="{73FC10DC-F744-4F62-ACA5-274CC8B19AAC}" type="datetimeFigureOut">
               <a:rPr lang="zh-CN" altLang="en-US" smtClean="0"/>
-              <a:t>2013-01-02</a:t>
+              <a:pPr/>
+              <a:t>2013/1/4</a:t>
             </a:fld>
             <a:endParaRPr lang="zh-CN" altLang="en-US"/>
           </a:p>
@@ -1076,6 +1086,7 @@
           <a:p>
             <a:fld id="{CDA17B46-3DC4-493C-B532-1D5B3F1A111B}" type="slidenum">
               <a:rPr lang="zh-CN" altLang="en-US" smtClean="0"/>
+              <a:pPr/>
               <a:t>‹#›</a:t>
             </a:fld>
             <a:endParaRPr lang="zh-CN" altLang="en-US"/>
@@ -1317,7 +1328,8 @@
           <a:p>
             <a:fld id="{73FC10DC-F744-4F62-ACA5-274CC8B19AAC}" type="datetimeFigureOut">
               <a:rPr lang="zh-CN" altLang="en-US" smtClean="0"/>
-              <a:t>2013-01-02</a:t>
+              <a:pPr/>
+              <a:t>2013/1/4</a:t>
             </a:fld>
             <a:endParaRPr lang="zh-CN" altLang="en-US"/>
           </a:p>
@@ -1359,6 +1371,7 @@
           <a:p>
             <a:fld id="{CDA17B46-3DC4-493C-B532-1D5B3F1A111B}" type="slidenum">
               <a:rPr lang="zh-CN" altLang="en-US" smtClean="0"/>
+              <a:pPr/>
               <a:t>‹#›</a:t>
             </a:fld>
             <a:endParaRPr lang="zh-CN" altLang="en-US"/>
@@ -1734,7 +1747,8 @@
           <a:p>
             <a:fld id="{73FC10DC-F744-4F62-ACA5-274CC8B19AAC}" type="datetimeFigureOut">
               <a:rPr lang="zh-CN" altLang="en-US" smtClean="0"/>
-              <a:t>2013-01-02</a:t>
+              <a:pPr/>
+              <a:t>2013/1/4</a:t>
             </a:fld>
             <a:endParaRPr lang="zh-CN" altLang="en-US"/>
           </a:p>
@@ -1776,6 +1790,7 @@
           <a:p>
             <a:fld id="{CDA17B46-3DC4-493C-B532-1D5B3F1A111B}" type="slidenum">
               <a:rPr lang="zh-CN" altLang="en-US" smtClean="0"/>
+              <a:pPr/>
               <a:t>‹#›</a:t>
             </a:fld>
             <a:endParaRPr lang="zh-CN" altLang="en-US"/>
@@ -1847,7 +1862,8 @@
           <a:p>
             <a:fld id="{73FC10DC-F744-4F62-ACA5-274CC8B19AAC}" type="datetimeFigureOut">
               <a:rPr lang="zh-CN" altLang="en-US" smtClean="0"/>
-              <a:t>2013-01-02</a:t>
+              <a:pPr/>
+              <a:t>2013/1/4</a:t>
             </a:fld>
             <a:endParaRPr lang="zh-CN" altLang="en-US"/>
           </a:p>
@@ -1889,6 +1905,7 @@
           <a:p>
             <a:fld id="{CDA17B46-3DC4-493C-B532-1D5B3F1A111B}" type="slidenum">
               <a:rPr lang="zh-CN" altLang="en-US" smtClean="0"/>
+              <a:pPr/>
               <a:t>‹#›</a:t>
             </a:fld>
             <a:endParaRPr lang="zh-CN" altLang="en-US"/>
@@ -1937,7 +1954,8 @@
           <a:p>
             <a:fld id="{73FC10DC-F744-4F62-ACA5-274CC8B19AAC}" type="datetimeFigureOut">
               <a:rPr lang="zh-CN" altLang="en-US" smtClean="0"/>
-              <a:t>2013-01-02</a:t>
+              <a:pPr/>
+              <a:t>2013/1/4</a:t>
             </a:fld>
             <a:endParaRPr lang="zh-CN" altLang="en-US"/>
           </a:p>
@@ -1979,6 +1997,7 @@
           <a:p>
             <a:fld id="{CDA17B46-3DC4-493C-B532-1D5B3F1A111B}" type="slidenum">
               <a:rPr lang="zh-CN" altLang="en-US" smtClean="0"/>
+              <a:pPr/>
               <a:t>‹#›</a:t>
             </a:fld>
             <a:endParaRPr lang="zh-CN" altLang="en-US"/>
@@ -2209,7 +2228,8 @@
           <a:p>
             <a:fld id="{73FC10DC-F744-4F62-ACA5-274CC8B19AAC}" type="datetimeFigureOut">
               <a:rPr lang="zh-CN" altLang="en-US" smtClean="0"/>
-              <a:t>2013-01-02</a:t>
+              <a:pPr/>
+              <a:t>2013/1/4</a:t>
             </a:fld>
             <a:endParaRPr lang="zh-CN" altLang="en-US"/>
           </a:p>
@@ -2251,6 +2271,7 @@
           <a:p>
             <a:fld id="{CDA17B46-3DC4-493C-B532-1D5B3F1A111B}" type="slidenum">
               <a:rPr lang="zh-CN" altLang="en-US" smtClean="0"/>
+              <a:pPr/>
               <a:t>‹#›</a:t>
             </a:fld>
             <a:endParaRPr lang="zh-CN" altLang="en-US"/>
@@ -2457,7 +2478,8 @@
           <a:p>
             <a:fld id="{73FC10DC-F744-4F62-ACA5-274CC8B19AAC}" type="datetimeFigureOut">
               <a:rPr lang="zh-CN" altLang="en-US" smtClean="0"/>
-              <a:t>2013-01-02</a:t>
+              <a:pPr/>
+              <a:t>2013/1/4</a:t>
             </a:fld>
             <a:endParaRPr lang="zh-CN" altLang="en-US"/>
           </a:p>
@@ -2499,6 +2521,7 @@
           <a:p>
             <a:fld id="{CDA17B46-3DC4-493C-B532-1D5B3F1A111B}" type="slidenum">
               <a:rPr lang="zh-CN" altLang="en-US" smtClean="0"/>
+              <a:pPr/>
               <a:t>‹#›</a:t>
             </a:fld>
             <a:endParaRPr lang="zh-CN" altLang="en-US"/>
@@ -2665,7 +2688,8 @@
           <a:p>
             <a:fld id="{73FC10DC-F744-4F62-ACA5-274CC8B19AAC}" type="datetimeFigureOut">
               <a:rPr lang="zh-CN" altLang="en-US" smtClean="0"/>
-              <a:t>2013-01-02</a:t>
+              <a:pPr/>
+              <a:t>2013/1/4</a:t>
             </a:fld>
             <a:endParaRPr lang="zh-CN" altLang="en-US"/>
           </a:p>
@@ -2743,6 +2767,7 @@
           <a:p>
             <a:fld id="{CDA17B46-3DC4-493C-B532-1D5B3F1A111B}" type="slidenum">
               <a:rPr lang="zh-CN" altLang="en-US" smtClean="0"/>
+              <a:pPr/>
               <a:t>‹#›</a:t>
             </a:fld>
             <a:endParaRPr lang="zh-CN" altLang="en-US"/>
@@ -3119,6 +3144,219 @@
           </a:p>
         </p:txBody>
       </p:sp>
+    </p:spTree>
+  </p:cSld>
+  <p:clrMapOvr>
+    <a:masterClrMapping/>
+  </p:clrMapOvr>
+</p:sld>
+</file>
+
+<file path=ppt/slides/slide2.xml><?xml version="1.0" encoding="utf-8"?>
+<p:sld xmlns:a="http://schemas.openxmlformats.org/drawingml/2006/main" xmlns:r="http://schemas.openxmlformats.org/officeDocument/2006/relationships" xmlns:p="http://schemas.openxmlformats.org/presentationml/2006/main">
+  <p:cSld>
+    <p:spTree>
+      <p:nvGrpSpPr>
+        <p:cNvPr id="1" name=""/>
+        <p:cNvGrpSpPr/>
+        <p:nvPr/>
+      </p:nvGrpSpPr>
+      <p:grpSpPr>
+        <a:xfrm>
+          <a:off x="0" y="0"/>
+          <a:ext cx="0" cy="0"/>
+          <a:chOff x="0" y="0"/>
+          <a:chExt cx="0" cy="0"/>
+        </a:xfrm>
+      </p:grpSpPr>
+      <p:grpSp>
+        <p:nvGrpSpPr>
+          <p:cNvPr id="7" name="组合 6"/>
+          <p:cNvGrpSpPr/>
+          <p:nvPr/>
+        </p:nvGrpSpPr>
+        <p:grpSpPr>
+          <a:xfrm>
+            <a:off x="2699792" y="164637"/>
+            <a:ext cx="3600400" cy="6000667"/>
+            <a:chOff x="2699792" y="164637"/>
+            <a:chExt cx="3600400" cy="6000667"/>
+          </a:xfrm>
+        </p:grpSpPr>
+        <p:sp>
+          <p:nvSpPr>
+            <p:cNvPr id="4" name="矩形 3"/>
+            <p:cNvSpPr/>
+            <p:nvPr/>
+          </p:nvSpPr>
+          <p:spPr>
+            <a:xfrm>
+              <a:off x="2699792" y="164637"/>
+              <a:ext cx="3600400" cy="6000667"/>
+            </a:xfrm>
+            <a:prstGeom prst="rect">
+              <a:avLst/>
+            </a:prstGeom>
+            <a:gradFill flip="none" rotWithShape="1">
+              <a:gsLst>
+                <a:gs pos="0">
+                  <a:schemeClr val="accent1">
+                    <a:lumMod val="60000"/>
+                    <a:lumOff val="40000"/>
+                  </a:schemeClr>
+                </a:gs>
+                <a:gs pos="65000">
+                  <a:srgbClr val="00B0F0"/>
+                </a:gs>
+              </a:gsLst>
+              <a:path path="circle">
+                <a:fillToRect l="50000" t="50000" r="50000" b="50000"/>
+              </a:path>
+              <a:tileRect/>
+            </a:gradFill>
+            <a:ln>
+              <a:noFill/>
+            </a:ln>
+          </p:spPr>
+          <p:style>
+            <a:lnRef idx="2">
+              <a:schemeClr val="accent1">
+                <a:shade val="50000"/>
+              </a:schemeClr>
+            </a:lnRef>
+            <a:fillRef idx="1">
+              <a:schemeClr val="accent1"/>
+            </a:fillRef>
+            <a:effectRef idx="0">
+              <a:schemeClr val="accent1"/>
+            </a:effectRef>
+            <a:fontRef idx="minor">
+              <a:schemeClr val="lt1"/>
+            </a:fontRef>
+          </p:style>
+          <p:txBody>
+            <a:bodyPr rtlCol="0" anchor="ctr"/>
+            <a:lstStyle/>
+            <a:p>
+              <a:pPr algn="ctr"/>
+              <a:endParaRPr lang="zh-CN" altLang="en-US"/>
+            </a:p>
+          </p:txBody>
+        </p:sp>
+        <p:sp>
+          <p:nvSpPr>
+            <p:cNvPr id="5" name="TextBox 4"/>
+            <p:cNvSpPr txBox="1"/>
+            <p:nvPr/>
+          </p:nvSpPr>
+          <p:spPr>
+            <a:xfrm>
+              <a:off x="2699792" y="2708920"/>
+              <a:ext cx="3600400" cy="523220"/>
+            </a:xfrm>
+            <a:prstGeom prst="rect">
+              <a:avLst/>
+            </a:prstGeom>
+            <a:noFill/>
+          </p:spPr>
+          <p:txBody>
+            <a:bodyPr wrap="square" rtlCol="0">
+              <a:spAutoFit/>
+            </a:bodyPr>
+            <a:lstStyle/>
+            <a:p>
+              <a:pPr algn="ctr"/>
+              <a:r>
+                <a:rPr lang="zh-CN" altLang="en-US" sz="2800" b="1" smtClean="0">
+                  <a:solidFill>
+                    <a:schemeClr val="bg1"/>
+                  </a:solidFill>
+                  <a:latin typeface="微软雅黑" pitchFamily="34" charset="-122"/>
+                  <a:ea typeface="微软雅黑" pitchFamily="34" charset="-122"/>
+                </a:rPr>
+                <a:t>微新闻</a:t>
+              </a:r>
+              <a:endParaRPr lang="zh-CN" altLang="en-US" sz="2800" b="1">
+                <a:solidFill>
+                  <a:schemeClr val="bg1"/>
+                </a:solidFill>
+                <a:latin typeface="微软雅黑" pitchFamily="34" charset="-122"/>
+                <a:ea typeface="微软雅黑" pitchFamily="34" charset="-122"/>
+              </a:endParaRPr>
+            </a:p>
+          </p:txBody>
+        </p:sp>
+        <p:sp>
+          <p:nvSpPr>
+            <p:cNvPr id="6" name="TextBox 5"/>
+            <p:cNvSpPr txBox="1"/>
+            <p:nvPr/>
+          </p:nvSpPr>
+          <p:spPr>
+            <a:xfrm>
+              <a:off x="2699792" y="3234462"/>
+              <a:ext cx="3600400" cy="338554"/>
+            </a:xfrm>
+            <a:prstGeom prst="rect">
+              <a:avLst/>
+            </a:prstGeom>
+            <a:noFill/>
+          </p:spPr>
+          <p:txBody>
+            <a:bodyPr wrap="square" rtlCol="0">
+              <a:spAutoFit/>
+            </a:bodyPr>
+            <a:lstStyle/>
+            <a:p>
+              <a:pPr algn="ctr"/>
+              <a:r>
+                <a:rPr lang="zh-CN" altLang="en-US" sz="1600" b="1" smtClean="0">
+                  <a:latin typeface="幼圆" pitchFamily="49" charset="-122"/>
+                  <a:ea typeface="幼圆" pitchFamily="49" charset="-122"/>
+                </a:rPr>
+                <a:t>              </a:t>
+              </a:r>
+              <a:r>
+                <a:rPr lang="zh-CN" altLang="en-US" sz="1600" b="1" smtClean="0">
+                  <a:solidFill>
+                    <a:schemeClr val="bg1"/>
+                  </a:solidFill>
+                  <a:latin typeface="幼圆" pitchFamily="49" charset="-122"/>
+                  <a:ea typeface="幼圆" pitchFamily="49" charset="-122"/>
+                </a:rPr>
+                <a:t>更快地</a:t>
+              </a:r>
+              <a:r>
+                <a:rPr lang="zh-CN" altLang="en-US" sz="1600" b="1" smtClean="0">
+                  <a:solidFill>
+                    <a:schemeClr val="bg1"/>
+                  </a:solidFill>
+                  <a:latin typeface="幼圆" pitchFamily="49" charset="-122"/>
+                  <a:ea typeface="幼圆" pitchFamily="49" charset="-122"/>
+                </a:rPr>
+                <a:t>掌握</a:t>
+              </a:r>
+              <a:r>
+                <a:rPr lang="zh-CN" altLang="en-US" sz="1600" b="1" smtClean="0">
+                  <a:solidFill>
+                    <a:schemeClr val="bg1"/>
+                  </a:solidFill>
+                  <a:latin typeface="幼圆" pitchFamily="49" charset="-122"/>
+                  <a:ea typeface="幼圆" pitchFamily="49" charset="-122"/>
+                </a:rPr>
+                <a:t>资讯</a:t>
+              </a:r>
+              <a:endParaRPr lang="zh-CN" altLang="en-US" sz="1600" b="1">
+                <a:solidFill>
+                  <a:schemeClr val="bg1"/>
+                </a:solidFill>
+                <a:latin typeface="幼圆" pitchFamily="49" charset="-122"/>
+                <a:ea typeface="幼圆" pitchFamily="49" charset="-122"/>
+              </a:endParaRPr>
+            </a:p>
+          </p:txBody>
+        </p:sp>
+      </p:grpSp>
     </p:spTree>
   </p:cSld>
   <p:clrMapOvr>

</xml_diff>

<commit_message>
update ui for tag list page, the sync count function.
</commit_message>
<xml_diff>
--- a/bg-template.pptx
+++ b/bg-template.pptx
@@ -7,6 +7,7 @@
   <p:sldIdLst>
     <p:sldId id="257" r:id="rId2"/>
     <p:sldId id="258" r:id="rId3"/>
+    <p:sldId id="259" r:id="rId4"/>
   </p:sldIdLst>
   <p:sldSz cx="9144000" cy="6858000" type="screen4x3"/>
   <p:notesSz cx="6858000" cy="9144000"/>
@@ -290,7 +291,7 @@
             <a:fld id="{73FC10DC-F744-4F62-ACA5-274CC8B19AAC}" type="datetimeFigureOut">
               <a:rPr lang="zh-CN" altLang="en-US" smtClean="0"/>
               <a:pPr/>
-              <a:t>2013/1/4</a:t>
+              <a:t>2013/1/5</a:t>
             </a:fld>
             <a:endParaRPr lang="zh-CN" altLang="en-US"/>
           </a:p>
@@ -457,7 +458,7 @@
             <a:fld id="{73FC10DC-F744-4F62-ACA5-274CC8B19AAC}" type="datetimeFigureOut">
               <a:rPr lang="zh-CN" altLang="en-US" smtClean="0"/>
               <a:pPr/>
-              <a:t>2013/1/4</a:t>
+              <a:t>2013/1/5</a:t>
             </a:fld>
             <a:endParaRPr lang="zh-CN" altLang="en-US"/>
           </a:p>
@@ -634,7 +635,7 @@
             <a:fld id="{73FC10DC-F744-4F62-ACA5-274CC8B19AAC}" type="datetimeFigureOut">
               <a:rPr lang="zh-CN" altLang="en-US" smtClean="0"/>
               <a:pPr/>
-              <a:t>2013/1/4</a:t>
+              <a:t>2013/1/5</a:t>
             </a:fld>
             <a:endParaRPr lang="zh-CN" altLang="en-US"/>
           </a:p>
@@ -801,7 +802,7 @@
             <a:fld id="{73FC10DC-F744-4F62-ACA5-274CC8B19AAC}" type="datetimeFigureOut">
               <a:rPr lang="zh-CN" altLang="en-US" smtClean="0"/>
               <a:pPr/>
-              <a:t>2013/1/4</a:t>
+              <a:t>2013/1/5</a:t>
             </a:fld>
             <a:endParaRPr lang="zh-CN" altLang="en-US"/>
           </a:p>
@@ -1044,7 +1045,7 @@
             <a:fld id="{73FC10DC-F744-4F62-ACA5-274CC8B19AAC}" type="datetimeFigureOut">
               <a:rPr lang="zh-CN" altLang="en-US" smtClean="0"/>
               <a:pPr/>
-              <a:t>2013/1/4</a:t>
+              <a:t>2013/1/5</a:t>
             </a:fld>
             <a:endParaRPr lang="zh-CN" altLang="en-US"/>
           </a:p>
@@ -1329,7 +1330,7 @@
             <a:fld id="{73FC10DC-F744-4F62-ACA5-274CC8B19AAC}" type="datetimeFigureOut">
               <a:rPr lang="zh-CN" altLang="en-US" smtClean="0"/>
               <a:pPr/>
-              <a:t>2013/1/4</a:t>
+              <a:t>2013/1/5</a:t>
             </a:fld>
             <a:endParaRPr lang="zh-CN" altLang="en-US"/>
           </a:p>
@@ -1748,7 +1749,7 @@
             <a:fld id="{73FC10DC-F744-4F62-ACA5-274CC8B19AAC}" type="datetimeFigureOut">
               <a:rPr lang="zh-CN" altLang="en-US" smtClean="0"/>
               <a:pPr/>
-              <a:t>2013/1/4</a:t>
+              <a:t>2013/1/5</a:t>
             </a:fld>
             <a:endParaRPr lang="zh-CN" altLang="en-US"/>
           </a:p>
@@ -1863,7 +1864,7 @@
             <a:fld id="{73FC10DC-F744-4F62-ACA5-274CC8B19AAC}" type="datetimeFigureOut">
               <a:rPr lang="zh-CN" altLang="en-US" smtClean="0"/>
               <a:pPr/>
-              <a:t>2013/1/4</a:t>
+              <a:t>2013/1/5</a:t>
             </a:fld>
             <a:endParaRPr lang="zh-CN" altLang="en-US"/>
           </a:p>
@@ -1955,7 +1956,7 @@
             <a:fld id="{73FC10DC-F744-4F62-ACA5-274CC8B19AAC}" type="datetimeFigureOut">
               <a:rPr lang="zh-CN" altLang="en-US" smtClean="0"/>
               <a:pPr/>
-              <a:t>2013/1/4</a:t>
+              <a:t>2013/1/5</a:t>
             </a:fld>
             <a:endParaRPr lang="zh-CN" altLang="en-US"/>
           </a:p>
@@ -2229,7 +2230,7 @@
             <a:fld id="{73FC10DC-F744-4F62-ACA5-274CC8B19AAC}" type="datetimeFigureOut">
               <a:rPr lang="zh-CN" altLang="en-US" smtClean="0"/>
               <a:pPr/>
-              <a:t>2013/1/4</a:t>
+              <a:t>2013/1/5</a:t>
             </a:fld>
             <a:endParaRPr lang="zh-CN" altLang="en-US"/>
           </a:p>
@@ -2479,7 +2480,7 @@
             <a:fld id="{73FC10DC-F744-4F62-ACA5-274CC8B19AAC}" type="datetimeFigureOut">
               <a:rPr lang="zh-CN" altLang="en-US" smtClean="0"/>
               <a:pPr/>
-              <a:t>2013/1/4</a:t>
+              <a:t>2013/1/5</a:t>
             </a:fld>
             <a:endParaRPr lang="zh-CN" altLang="en-US"/>
           </a:p>
@@ -2689,7 +2690,7 @@
             <a:fld id="{73FC10DC-F744-4F62-ACA5-274CC8B19AAC}" type="datetimeFigureOut">
               <a:rPr lang="zh-CN" altLang="en-US" smtClean="0"/>
               <a:pPr/>
-              <a:t>2013/1/4</a:t>
+              <a:t>2013/1/5</a:t>
             </a:fld>
             <a:endParaRPr lang="zh-CN" altLang="en-US"/>
           </a:p>
@@ -3062,25 +3063,6 @@
       </p:grpSpPr>
       <p:sp>
         <p:nvSpPr>
-          <p:cNvPr id="2" name="标题 1"/>
-          <p:cNvSpPr>
-            <a:spLocks noGrp="1"/>
-          </p:cNvSpPr>
-          <p:nvPr>
-            <p:ph type="title"/>
-          </p:nvPr>
-        </p:nvSpPr>
-        <p:spPr/>
-        <p:txBody>
-          <a:bodyPr/>
-          <a:lstStyle/>
-          <a:p>
-            <a:endParaRPr lang="zh-CN" altLang="en-US"/>
-          </a:p>
-        </p:txBody>
-      </p:sp>
-      <p:sp>
-        <p:nvSpPr>
           <p:cNvPr id="4" name="矩形 3"/>
           <p:cNvSpPr/>
           <p:nvPr/>
@@ -3141,6 +3123,43 @@
           <a:p>
             <a:pPr algn="ctr"/>
             <a:endParaRPr lang="zh-CN" altLang="en-US" dirty="0"/>
+          </a:p>
+        </p:txBody>
+      </p:sp>
+      <p:sp>
+        <p:nvSpPr>
+          <p:cNvPr id="5" name="矩形 4"/>
+          <p:cNvSpPr/>
+          <p:nvPr/>
+        </p:nvSpPr>
+        <p:spPr>
+          <a:xfrm>
+            <a:off x="611560" y="5445224"/>
+            <a:ext cx="5832648" cy="369332"/>
+          </a:xfrm>
+          <a:prstGeom prst="rect">
+            <a:avLst/>
+          </a:prstGeom>
+        </p:spPr>
+        <p:txBody>
+          <a:bodyPr wrap="square">
+            <a:spAutoFit/>
+          </a:bodyPr>
+          <a:lstStyle/>
+          <a:p>
+            <a:r>
+              <a:rPr lang="zh-CN" altLang="en-US" smtClean="0"/>
+              <a:t>新闻详情中</a:t>
+            </a:r>
+            <a:r>
+              <a:rPr lang="en-US" altLang="zh-CN" smtClean="0"/>
+              <a:t>title</a:t>
+            </a:r>
+            <a:r>
+              <a:rPr lang="zh-CN" altLang="en-US" smtClean="0"/>
+              <a:t>的预背景，会被新闻图片代替</a:t>
+            </a:r>
+            <a:endParaRPr lang="zh-CN" altLang="en-US"/>
           </a:p>
         </p:txBody>
       </p:sp>
@@ -3324,27 +3343,7 @@
                   <a:latin typeface="幼圆" pitchFamily="49" charset="-122"/>
                   <a:ea typeface="幼圆" pitchFamily="49" charset="-122"/>
                 </a:rPr>
-                <a:t>更快地</a:t>
-              </a:r>
-              <a:r>
-                <a:rPr lang="zh-CN" altLang="en-US" sz="1600" b="1" smtClean="0">
-                  <a:solidFill>
-                    <a:schemeClr val="bg1"/>
-                  </a:solidFill>
-                  <a:latin typeface="幼圆" pitchFamily="49" charset="-122"/>
-                  <a:ea typeface="幼圆" pitchFamily="49" charset="-122"/>
-                </a:rPr>
-                <a:t>掌握</a:t>
-              </a:r>
-              <a:r>
-                <a:rPr lang="zh-CN" altLang="en-US" sz="1600" b="1" smtClean="0">
-                  <a:solidFill>
-                    <a:schemeClr val="bg1"/>
-                  </a:solidFill>
-                  <a:latin typeface="幼圆" pitchFamily="49" charset="-122"/>
-                  <a:ea typeface="幼圆" pitchFamily="49" charset="-122"/>
-                </a:rPr>
-                <a:t>资讯</a:t>
+                <a:t>更快地掌握资讯</a:t>
               </a:r>
               <a:endParaRPr lang="zh-CN" altLang="en-US" sz="1600" b="1">
                 <a:solidFill>
@@ -3357,6 +3356,124 @@
           </p:txBody>
         </p:sp>
       </p:grpSp>
+    </p:spTree>
+  </p:cSld>
+  <p:clrMapOvr>
+    <a:masterClrMapping/>
+  </p:clrMapOvr>
+</p:sld>
+</file>
+
+<file path=ppt/slides/slide3.xml><?xml version="1.0" encoding="utf-8"?>
+<p:sld xmlns:a="http://schemas.openxmlformats.org/drawingml/2006/main" xmlns:r="http://schemas.openxmlformats.org/officeDocument/2006/relationships" xmlns:p="http://schemas.openxmlformats.org/presentationml/2006/main">
+  <p:cSld>
+    <p:spTree>
+      <p:nvGrpSpPr>
+        <p:cNvPr id="1" name=""/>
+        <p:cNvGrpSpPr/>
+        <p:nvPr/>
+      </p:nvGrpSpPr>
+      <p:grpSpPr>
+        <a:xfrm>
+          <a:off x="0" y="0"/>
+          <a:ext cx="0" cy="0"/>
+          <a:chOff x="0" y="0"/>
+          <a:chExt cx="0" cy="0"/>
+        </a:xfrm>
+      </p:grpSpPr>
+      <p:sp>
+        <p:nvSpPr>
+          <p:cNvPr id="2" name="圆角矩形 1"/>
+          <p:cNvSpPr/>
+          <p:nvPr/>
+        </p:nvSpPr>
+        <p:spPr>
+          <a:xfrm>
+            <a:off x="3203848" y="1988840"/>
+            <a:ext cx="1296144" cy="792088"/>
+          </a:xfrm>
+          <a:prstGeom prst="roundRect">
+            <a:avLst/>
+          </a:prstGeom>
+          <a:ln>
+            <a:noFill/>
+          </a:ln>
+          <a:effectLst/>
+          <a:scene3d>
+            <a:camera prst="orthographicFront">
+              <a:rot lat="0" lon="0" rev="0"/>
+            </a:camera>
+            <a:lightRig rig="chilly" dir="t">
+              <a:rot lat="0" lon="0" rev="18480000"/>
+            </a:lightRig>
+          </a:scene3d>
+          <a:sp3d prstMaterial="clear"/>
+        </p:spPr>
+        <p:style>
+          <a:lnRef idx="2">
+            <a:schemeClr val="accent1">
+              <a:shade val="50000"/>
+            </a:schemeClr>
+          </a:lnRef>
+          <a:fillRef idx="1">
+            <a:schemeClr val="accent1"/>
+          </a:fillRef>
+          <a:effectRef idx="0">
+            <a:schemeClr val="accent1"/>
+          </a:effectRef>
+          <a:fontRef idx="minor">
+            <a:schemeClr val="lt1"/>
+          </a:fontRef>
+        </p:style>
+        <p:txBody>
+          <a:bodyPr rtlCol="0" anchor="ctr"/>
+          <a:lstStyle/>
+          <a:p>
+            <a:pPr algn="ctr"/>
+            <a:endParaRPr lang="zh-CN" altLang="en-US">
+              <a:solidFill>
+                <a:schemeClr val="bg1">
+                  <a:lumMod val="95000"/>
+                </a:schemeClr>
+              </a:solidFill>
+            </a:endParaRPr>
+          </a:p>
+        </p:txBody>
+      </p:sp>
+      <p:sp>
+        <p:nvSpPr>
+          <p:cNvPr id="3" name="TextBox 2"/>
+          <p:cNvSpPr txBox="1"/>
+          <p:nvPr/>
+        </p:nvSpPr>
+        <p:spPr>
+          <a:xfrm>
+            <a:off x="827584" y="4149080"/>
+            <a:ext cx="7416824" cy="369332"/>
+          </a:xfrm>
+          <a:prstGeom prst="rect">
+            <a:avLst/>
+          </a:prstGeom>
+          <a:noFill/>
+        </p:spPr>
+        <p:txBody>
+          <a:bodyPr wrap="square" rtlCol="0">
+            <a:spAutoFit/>
+          </a:bodyPr>
+          <a:lstStyle/>
+          <a:p>
+            <a:r>
+              <a:rPr lang="en-US" altLang="zh-CN" smtClean="0"/>
+              <a:t>Tags</a:t>
+            </a:r>
+            <a:r>
+              <a:rPr lang="zh-CN" altLang="en-US" smtClean="0"/>
+              <a:t>列表中同步新闻数量的背景</a:t>
+            </a:r>
+            <a:endParaRPr lang="zh-CN" altLang="en-US"/>
+          </a:p>
+        </p:txBody>
+      </p:sp>
     </p:spTree>
   </p:cSld>
   <p:clrMapOvr>

</xml_diff>

<commit_message>
udpate the ui of summary detail page. added the random background image.
</commit_message>
<xml_diff>
--- a/bg-template.pptx
+++ b/bg-template.pptx
@@ -291,7 +291,7 @@
             <a:fld id="{73FC10DC-F744-4F62-ACA5-274CC8B19AAC}" type="datetimeFigureOut">
               <a:rPr lang="zh-CN" altLang="en-US" smtClean="0"/>
               <a:pPr/>
-              <a:t>2013/1/5</a:t>
+              <a:t>2013/1/23</a:t>
             </a:fld>
             <a:endParaRPr lang="zh-CN" altLang="en-US"/>
           </a:p>
@@ -458,7 +458,7 @@
             <a:fld id="{73FC10DC-F744-4F62-ACA5-274CC8B19AAC}" type="datetimeFigureOut">
               <a:rPr lang="zh-CN" altLang="en-US" smtClean="0"/>
               <a:pPr/>
-              <a:t>2013/1/5</a:t>
+              <a:t>2013/1/23</a:t>
             </a:fld>
             <a:endParaRPr lang="zh-CN" altLang="en-US"/>
           </a:p>
@@ -635,7 +635,7 @@
             <a:fld id="{73FC10DC-F744-4F62-ACA5-274CC8B19AAC}" type="datetimeFigureOut">
               <a:rPr lang="zh-CN" altLang="en-US" smtClean="0"/>
               <a:pPr/>
-              <a:t>2013/1/5</a:t>
+              <a:t>2013/1/23</a:t>
             </a:fld>
             <a:endParaRPr lang="zh-CN" altLang="en-US"/>
           </a:p>
@@ -802,7 +802,7 @@
             <a:fld id="{73FC10DC-F744-4F62-ACA5-274CC8B19AAC}" type="datetimeFigureOut">
               <a:rPr lang="zh-CN" altLang="en-US" smtClean="0"/>
               <a:pPr/>
-              <a:t>2013/1/5</a:t>
+              <a:t>2013/1/23</a:t>
             </a:fld>
             <a:endParaRPr lang="zh-CN" altLang="en-US"/>
           </a:p>
@@ -1045,7 +1045,7 @@
             <a:fld id="{73FC10DC-F744-4F62-ACA5-274CC8B19AAC}" type="datetimeFigureOut">
               <a:rPr lang="zh-CN" altLang="en-US" smtClean="0"/>
               <a:pPr/>
-              <a:t>2013/1/5</a:t>
+              <a:t>2013/1/23</a:t>
             </a:fld>
             <a:endParaRPr lang="zh-CN" altLang="en-US"/>
           </a:p>
@@ -1330,7 +1330,7 @@
             <a:fld id="{73FC10DC-F744-4F62-ACA5-274CC8B19AAC}" type="datetimeFigureOut">
               <a:rPr lang="zh-CN" altLang="en-US" smtClean="0"/>
               <a:pPr/>
-              <a:t>2013/1/5</a:t>
+              <a:t>2013/1/23</a:t>
             </a:fld>
             <a:endParaRPr lang="zh-CN" altLang="en-US"/>
           </a:p>
@@ -1749,7 +1749,7 @@
             <a:fld id="{73FC10DC-F744-4F62-ACA5-274CC8B19AAC}" type="datetimeFigureOut">
               <a:rPr lang="zh-CN" altLang="en-US" smtClean="0"/>
               <a:pPr/>
-              <a:t>2013/1/5</a:t>
+              <a:t>2013/1/23</a:t>
             </a:fld>
             <a:endParaRPr lang="zh-CN" altLang="en-US"/>
           </a:p>
@@ -1864,7 +1864,7 @@
             <a:fld id="{73FC10DC-F744-4F62-ACA5-274CC8B19AAC}" type="datetimeFigureOut">
               <a:rPr lang="zh-CN" altLang="en-US" smtClean="0"/>
               <a:pPr/>
-              <a:t>2013/1/5</a:t>
+              <a:t>2013/1/23</a:t>
             </a:fld>
             <a:endParaRPr lang="zh-CN" altLang="en-US"/>
           </a:p>
@@ -1956,7 +1956,7 @@
             <a:fld id="{73FC10DC-F744-4F62-ACA5-274CC8B19AAC}" type="datetimeFigureOut">
               <a:rPr lang="zh-CN" altLang="en-US" smtClean="0"/>
               <a:pPr/>
-              <a:t>2013/1/5</a:t>
+              <a:t>2013/1/23</a:t>
             </a:fld>
             <a:endParaRPr lang="zh-CN" altLang="en-US"/>
           </a:p>
@@ -2230,7 +2230,7 @@
             <a:fld id="{73FC10DC-F744-4F62-ACA5-274CC8B19AAC}" type="datetimeFigureOut">
               <a:rPr lang="zh-CN" altLang="en-US" smtClean="0"/>
               <a:pPr/>
-              <a:t>2013/1/5</a:t>
+              <a:t>2013/1/23</a:t>
             </a:fld>
             <a:endParaRPr lang="zh-CN" altLang="en-US"/>
           </a:p>
@@ -2480,7 +2480,7 @@
             <a:fld id="{73FC10DC-F744-4F62-ACA5-274CC8B19AAC}" type="datetimeFigureOut">
               <a:rPr lang="zh-CN" altLang="en-US" smtClean="0"/>
               <a:pPr/>
-              <a:t>2013/1/5</a:t>
+              <a:t>2013/1/23</a:t>
             </a:fld>
             <a:endParaRPr lang="zh-CN" altLang="en-US"/>
           </a:p>
@@ -2541,9 +2541,15 @@
 <p:sldMaster xmlns:a="http://schemas.openxmlformats.org/drawingml/2006/main" xmlns:r="http://schemas.openxmlformats.org/officeDocument/2006/relationships" xmlns:p="http://schemas.openxmlformats.org/presentationml/2006/main">
   <p:cSld>
     <p:bg>
-      <p:bgRef idx="1001">
-        <a:schemeClr val="bg1"/>
-      </p:bgRef>
+      <p:bgPr>
+        <a:solidFill>
+          <a:schemeClr val="tx1">
+            <a:lumMod val="85000"/>
+            <a:lumOff val="15000"/>
+          </a:schemeClr>
+        </a:solidFill>
+        <a:effectLst/>
+      </p:bgPr>
     </p:bg>
     <p:spTree>
       <p:nvGrpSpPr>
@@ -2690,7 +2696,7 @@
             <a:fld id="{73FC10DC-F744-4F62-ACA5-274CC8B19AAC}" type="datetimeFigureOut">
               <a:rPr lang="zh-CN" altLang="en-US" smtClean="0"/>
               <a:pPr/>
-              <a:t>2013/1/5</a:t>
+              <a:t>2013/1/23</a:t>
             </a:fld>
             <a:endParaRPr lang="zh-CN" altLang="en-US"/>
           </a:p>
@@ -3069,7 +3075,7 @@
         </p:nvSpPr>
         <p:spPr>
           <a:xfrm>
-            <a:off x="2214546" y="2357430"/>
+            <a:off x="1691680" y="1988840"/>
             <a:ext cx="4714908" cy="2071702"/>
           </a:xfrm>
           <a:prstGeom prst="rect">
@@ -3077,31 +3083,23 @@
           </a:prstGeom>
           <a:gradFill flip="none" rotWithShape="1">
             <a:gsLst>
-              <a:gs pos="0">
-                <a:schemeClr val="accent2">
-                  <a:lumMod val="75000"/>
-                  <a:shade val="30000"/>
-                  <a:satMod val="115000"/>
-                </a:schemeClr>
-              </a:gs>
-              <a:gs pos="50000">
-                <a:schemeClr val="accent2">
-                  <a:lumMod val="75000"/>
-                  <a:shade val="67500"/>
-                  <a:satMod val="115000"/>
-                </a:schemeClr>
+              <a:gs pos="46000">
+                <a:srgbClr val="F79646"/>
               </a:gs>
               <a:gs pos="100000">
-                <a:schemeClr val="accent2">
-                  <a:lumMod val="75000"/>
-                  <a:shade val="100000"/>
-                  <a:satMod val="115000"/>
+                <a:schemeClr val="accent6">
+                  <a:lumMod val="60000"/>
+                  <a:lumOff val="40000"/>
                 </a:schemeClr>
               </a:gs>
             </a:gsLst>
-            <a:lin ang="5400000" scaled="1"/>
+            <a:lin ang="16200000" scaled="1"/>
             <a:tileRect/>
           </a:gradFill>
+          <a:ln>
+            <a:noFill/>
+          </a:ln>
+          <a:effectLst/>
         </p:spPr>
         <p:style>
           <a:lnRef idx="1">
@@ -3148,18 +3146,34 @@
           <a:lstStyle/>
           <a:p>
             <a:r>
-              <a:rPr lang="zh-CN" altLang="en-US" smtClean="0"/>
+              <a:rPr lang="zh-CN" altLang="en-US" smtClean="0">
+                <a:solidFill>
+                  <a:schemeClr val="bg1"/>
+                </a:solidFill>
+              </a:rPr>
               <a:t>新闻详情中</a:t>
             </a:r>
             <a:r>
-              <a:rPr lang="en-US" altLang="zh-CN" smtClean="0"/>
+              <a:rPr lang="en-US" altLang="zh-CN" smtClean="0">
+                <a:solidFill>
+                  <a:schemeClr val="bg1"/>
+                </a:solidFill>
+              </a:rPr>
               <a:t>title</a:t>
             </a:r>
             <a:r>
-              <a:rPr lang="zh-CN" altLang="en-US" smtClean="0"/>
+              <a:rPr lang="zh-CN" altLang="en-US" smtClean="0">
+                <a:solidFill>
+                  <a:schemeClr val="bg1"/>
+                </a:solidFill>
+              </a:rPr>
               <a:t>的预背景，会被新闻图片代替</a:t>
             </a:r>
-            <a:endParaRPr lang="zh-CN" altLang="en-US"/>
+            <a:endParaRPr lang="zh-CN" altLang="en-US">
+              <a:solidFill>
+                <a:schemeClr val="bg1"/>
+              </a:solidFill>
+            </a:endParaRPr>
           </a:p>
         </p:txBody>
       </p:sp>
@@ -3383,72 +3397,13 @@
       </p:grpSpPr>
       <p:sp>
         <p:nvSpPr>
-          <p:cNvPr id="2" name="圆角矩形 1"/>
-          <p:cNvSpPr/>
-          <p:nvPr/>
-        </p:nvSpPr>
-        <p:spPr>
-          <a:xfrm>
-            <a:off x="3203848" y="1988840"/>
-            <a:ext cx="1296144" cy="792088"/>
-          </a:xfrm>
-          <a:prstGeom prst="roundRect">
-            <a:avLst/>
-          </a:prstGeom>
-          <a:ln>
-            <a:noFill/>
-          </a:ln>
-          <a:effectLst/>
-          <a:scene3d>
-            <a:camera prst="orthographicFront">
-              <a:rot lat="0" lon="0" rev="0"/>
-            </a:camera>
-            <a:lightRig rig="chilly" dir="t">
-              <a:rot lat="0" lon="0" rev="18480000"/>
-            </a:lightRig>
-          </a:scene3d>
-          <a:sp3d prstMaterial="clear"/>
-        </p:spPr>
-        <p:style>
-          <a:lnRef idx="2">
-            <a:schemeClr val="accent1">
-              <a:shade val="50000"/>
-            </a:schemeClr>
-          </a:lnRef>
-          <a:fillRef idx="1">
-            <a:schemeClr val="accent1"/>
-          </a:fillRef>
-          <a:effectRef idx="0">
-            <a:schemeClr val="accent1"/>
-          </a:effectRef>
-          <a:fontRef idx="minor">
-            <a:schemeClr val="lt1"/>
-          </a:fontRef>
-        </p:style>
-        <p:txBody>
-          <a:bodyPr rtlCol="0" anchor="ctr"/>
-          <a:lstStyle/>
-          <a:p>
-            <a:pPr algn="ctr"/>
-            <a:endParaRPr lang="zh-CN" altLang="en-US">
-              <a:solidFill>
-                <a:schemeClr val="bg1">
-                  <a:lumMod val="95000"/>
-                </a:schemeClr>
-              </a:solidFill>
-            </a:endParaRPr>
-          </a:p>
-        </p:txBody>
-      </p:sp>
-      <p:sp>
-        <p:nvSpPr>
           <p:cNvPr id="3" name="TextBox 2"/>
           <p:cNvSpPr txBox="1"/>
           <p:nvPr/>
         </p:nvSpPr>
         <p:spPr>
           <a:xfrm>
-            <a:off x="827584" y="4149080"/>
+            <a:off x="755576" y="5157192"/>
             <a:ext cx="7416824" cy="369332"/>
           </a:xfrm>
           <a:prstGeom prst="rect">
@@ -3463,17 +3418,539 @@
           <a:lstStyle/>
           <a:p>
             <a:r>
-              <a:rPr lang="en-US" altLang="zh-CN" smtClean="0"/>
+              <a:rPr lang="en-US" altLang="zh-CN" smtClean="0">
+                <a:solidFill>
+                  <a:schemeClr val="bg1"/>
+                </a:solidFill>
+              </a:rPr>
               <a:t>Tags</a:t>
             </a:r>
             <a:r>
-              <a:rPr lang="zh-CN" altLang="en-US" smtClean="0"/>
+              <a:rPr lang="zh-CN" altLang="en-US" smtClean="0">
+                <a:solidFill>
+                  <a:schemeClr val="bg1"/>
+                </a:solidFill>
+              </a:rPr>
               <a:t>列表中同步新闻数量的背景</a:t>
             </a:r>
-            <a:endParaRPr lang="zh-CN" altLang="en-US"/>
-          </a:p>
-        </p:txBody>
-      </p:sp>
+            <a:endParaRPr lang="zh-CN" altLang="en-US">
+              <a:solidFill>
+                <a:schemeClr val="bg1"/>
+              </a:solidFill>
+            </a:endParaRPr>
+          </a:p>
+        </p:txBody>
+      </p:sp>
+      <p:sp>
+        <p:nvSpPr>
+          <p:cNvPr id="8" name="矩形 7"/>
+          <p:cNvSpPr/>
+          <p:nvPr/>
+        </p:nvSpPr>
+        <p:spPr>
+          <a:xfrm>
+            <a:off x="899592" y="2132856"/>
+            <a:ext cx="2736304" cy="720080"/>
+          </a:xfrm>
+          <a:prstGeom prst="rect">
+            <a:avLst/>
+          </a:prstGeom>
+          <a:gradFill flip="none" rotWithShape="1">
+            <a:gsLst>
+              <a:gs pos="0">
+                <a:schemeClr val="accent2">
+                  <a:lumMod val="75000"/>
+                  <a:shade val="30000"/>
+                  <a:satMod val="115000"/>
+                </a:schemeClr>
+              </a:gs>
+              <a:gs pos="73000">
+                <a:schemeClr val="accent2">
+                  <a:lumMod val="75000"/>
+                  <a:shade val="67500"/>
+                  <a:satMod val="115000"/>
+                </a:schemeClr>
+              </a:gs>
+              <a:gs pos="100000">
+                <a:schemeClr val="accent2">
+                  <a:lumMod val="75000"/>
+                  <a:shade val="100000"/>
+                  <a:satMod val="115000"/>
+                </a:schemeClr>
+              </a:gs>
+            </a:gsLst>
+            <a:lin ang="20400000" scaled="0"/>
+            <a:tileRect/>
+          </a:gradFill>
+          <a:ln>
+            <a:noFill/>
+          </a:ln>
+          <a:effectLst/>
+        </p:spPr>
+        <p:style>
+          <a:lnRef idx="1">
+            <a:schemeClr val="accent6"/>
+          </a:lnRef>
+          <a:fillRef idx="3">
+            <a:schemeClr val="accent6"/>
+          </a:fillRef>
+          <a:effectRef idx="2">
+            <a:schemeClr val="accent6"/>
+          </a:effectRef>
+          <a:fontRef idx="minor">
+            <a:schemeClr val="lt1"/>
+          </a:fontRef>
+        </p:style>
+        <p:txBody>
+          <a:bodyPr rtlCol="0" anchor="ctr"/>
+          <a:lstStyle/>
+          <a:p>
+            <a:pPr algn="ctr"/>
+            <a:endParaRPr lang="zh-CN" altLang="en-US" dirty="0"/>
+          </a:p>
+        </p:txBody>
+      </p:sp>
+      <p:sp>
+        <p:nvSpPr>
+          <p:cNvPr id="9" name="矩形 8"/>
+          <p:cNvSpPr/>
+          <p:nvPr/>
+        </p:nvSpPr>
+        <p:spPr>
+          <a:xfrm>
+            <a:off x="899592" y="3068960"/>
+            <a:ext cx="2736304" cy="720080"/>
+          </a:xfrm>
+          <a:prstGeom prst="rect">
+            <a:avLst/>
+          </a:prstGeom>
+          <a:gradFill flip="none" rotWithShape="1">
+            <a:gsLst>
+              <a:gs pos="0">
+                <a:schemeClr val="accent2">
+                  <a:lumMod val="75000"/>
+                  <a:shade val="30000"/>
+                  <a:satMod val="115000"/>
+                </a:schemeClr>
+              </a:gs>
+              <a:gs pos="73000">
+                <a:schemeClr val="accent2">
+                  <a:lumMod val="75000"/>
+                  <a:shade val="67500"/>
+                  <a:satMod val="115000"/>
+                </a:schemeClr>
+              </a:gs>
+              <a:gs pos="100000">
+                <a:schemeClr val="accent2">
+                  <a:lumMod val="75000"/>
+                  <a:shade val="100000"/>
+                  <a:satMod val="115000"/>
+                </a:schemeClr>
+              </a:gs>
+            </a:gsLst>
+            <a:lin ang="20400000" scaled="0"/>
+            <a:tileRect/>
+          </a:gradFill>
+          <a:ln>
+            <a:noFill/>
+          </a:ln>
+          <a:effectLst/>
+        </p:spPr>
+        <p:style>
+          <a:lnRef idx="1">
+            <a:schemeClr val="accent6"/>
+          </a:lnRef>
+          <a:fillRef idx="3">
+            <a:schemeClr val="accent6"/>
+          </a:fillRef>
+          <a:effectRef idx="2">
+            <a:schemeClr val="accent6"/>
+          </a:effectRef>
+          <a:fontRef idx="minor">
+            <a:schemeClr val="lt1"/>
+          </a:fontRef>
+        </p:style>
+        <p:txBody>
+          <a:bodyPr rtlCol="0" anchor="ctr"/>
+          <a:lstStyle/>
+          <a:p>
+            <a:pPr algn="ctr"/>
+            <a:endParaRPr lang="zh-CN" altLang="en-US" dirty="0"/>
+          </a:p>
+        </p:txBody>
+      </p:sp>
+      <p:grpSp>
+        <p:nvGrpSpPr>
+          <p:cNvPr id="13" name="组合 12"/>
+          <p:cNvGrpSpPr/>
+          <p:nvPr/>
+        </p:nvGrpSpPr>
+        <p:grpSpPr>
+          <a:xfrm>
+            <a:off x="899592" y="1196752"/>
+            <a:ext cx="2736304" cy="720080"/>
+            <a:chOff x="899592" y="1196752"/>
+            <a:chExt cx="2736304" cy="720080"/>
+          </a:xfrm>
+        </p:grpSpPr>
+        <p:sp>
+          <p:nvSpPr>
+            <p:cNvPr id="4" name="矩形 3"/>
+            <p:cNvSpPr/>
+            <p:nvPr/>
+          </p:nvSpPr>
+          <p:spPr>
+            <a:xfrm>
+              <a:off x="899592" y="1196752"/>
+              <a:ext cx="2736304" cy="720080"/>
+            </a:xfrm>
+            <a:prstGeom prst="rect">
+              <a:avLst/>
+            </a:prstGeom>
+            <a:gradFill flip="none" rotWithShape="1">
+              <a:gsLst>
+                <a:gs pos="0">
+                  <a:schemeClr val="accent2">
+                    <a:lumMod val="75000"/>
+                    <a:shade val="30000"/>
+                    <a:satMod val="115000"/>
+                  </a:schemeClr>
+                </a:gs>
+                <a:gs pos="73000">
+                  <a:schemeClr val="accent2">
+                    <a:lumMod val="75000"/>
+                    <a:shade val="67500"/>
+                    <a:satMod val="115000"/>
+                  </a:schemeClr>
+                </a:gs>
+                <a:gs pos="100000">
+                  <a:schemeClr val="accent2">
+                    <a:lumMod val="75000"/>
+                    <a:shade val="100000"/>
+                    <a:satMod val="115000"/>
+                  </a:schemeClr>
+                </a:gs>
+              </a:gsLst>
+              <a:lin ang="20400000" scaled="0"/>
+              <a:tileRect/>
+            </a:gradFill>
+            <a:ln>
+              <a:noFill/>
+            </a:ln>
+            <a:effectLst/>
+          </p:spPr>
+          <p:style>
+            <a:lnRef idx="1">
+              <a:schemeClr val="accent6"/>
+            </a:lnRef>
+            <a:fillRef idx="3">
+              <a:schemeClr val="accent6"/>
+            </a:fillRef>
+            <a:effectRef idx="2">
+              <a:schemeClr val="accent6"/>
+            </a:effectRef>
+            <a:fontRef idx="minor">
+              <a:schemeClr val="lt1"/>
+            </a:fontRef>
+          </p:style>
+          <p:txBody>
+            <a:bodyPr rtlCol="0" anchor="ctr"/>
+            <a:lstStyle/>
+            <a:p>
+              <a:pPr algn="ctr"/>
+              <a:endParaRPr lang="zh-CN" altLang="en-US" dirty="0"/>
+            </a:p>
+          </p:txBody>
+        </p:sp>
+        <p:sp>
+          <p:nvSpPr>
+            <p:cNvPr id="10" name="TextBox 9"/>
+            <p:cNvSpPr txBox="1"/>
+            <p:nvPr/>
+          </p:nvSpPr>
+          <p:spPr>
+            <a:xfrm>
+              <a:off x="1115616" y="1418292"/>
+              <a:ext cx="576064" cy="276999"/>
+            </a:xfrm>
+            <a:prstGeom prst="rect">
+              <a:avLst/>
+            </a:prstGeom>
+            <a:noFill/>
+          </p:spPr>
+          <p:txBody>
+            <a:bodyPr wrap="square" rtlCol="0">
+              <a:spAutoFit/>
+            </a:bodyPr>
+            <a:lstStyle/>
+            <a:p>
+              <a:r>
+                <a:rPr lang="zh-CN" altLang="en-US" sz="1200" b="1" smtClean="0">
+                  <a:solidFill>
+                    <a:schemeClr val="bg1"/>
+                  </a:solidFill>
+                  <a:latin typeface="微软雅黑" pitchFamily="34" charset="-122"/>
+                  <a:ea typeface="微软雅黑" pitchFamily="34" charset="-122"/>
+                </a:rPr>
+                <a:t>头条</a:t>
+              </a:r>
+              <a:endParaRPr lang="zh-CN" altLang="en-US" sz="1200" b="1">
+                <a:solidFill>
+                  <a:schemeClr val="bg1"/>
+                </a:solidFill>
+                <a:latin typeface="微软雅黑" pitchFamily="34" charset="-122"/>
+                <a:ea typeface="微软雅黑" pitchFamily="34" charset="-122"/>
+              </a:endParaRPr>
+            </a:p>
+          </p:txBody>
+        </p:sp>
+        <p:sp>
+          <p:nvSpPr>
+            <p:cNvPr id="11" name="TextBox 10"/>
+            <p:cNvSpPr txBox="1"/>
+            <p:nvPr/>
+          </p:nvSpPr>
+          <p:spPr>
+            <a:xfrm>
+              <a:off x="1115616" y="1628800"/>
+              <a:ext cx="1656184" cy="215444"/>
+            </a:xfrm>
+            <a:prstGeom prst="rect">
+              <a:avLst/>
+            </a:prstGeom>
+            <a:noFill/>
+          </p:spPr>
+          <p:txBody>
+            <a:bodyPr wrap="square" rtlCol="0">
+              <a:spAutoFit/>
+            </a:bodyPr>
+            <a:lstStyle/>
+            <a:p>
+              <a:r>
+                <a:rPr lang="zh-CN" altLang="en-US" sz="800" smtClean="0">
+                  <a:solidFill>
+                    <a:schemeClr val="bg1"/>
+                  </a:solidFill>
+                  <a:latin typeface="微软雅黑" pitchFamily="34" charset="-122"/>
+                  <a:ea typeface="微软雅黑" pitchFamily="34" charset="-122"/>
+                </a:rPr>
+                <a:t>国内外第一时间头条新闻</a:t>
+              </a:r>
+              <a:endParaRPr lang="zh-CN" altLang="en-US" sz="800">
+                <a:solidFill>
+                  <a:schemeClr val="bg1"/>
+                </a:solidFill>
+                <a:latin typeface="微软雅黑" pitchFamily="34" charset="-122"/>
+                <a:ea typeface="微软雅黑" pitchFamily="34" charset="-122"/>
+              </a:endParaRPr>
+            </a:p>
+          </p:txBody>
+        </p:sp>
+        <p:sp>
+          <p:nvSpPr>
+            <p:cNvPr id="12" name="任意多边形 11"/>
+            <p:cNvSpPr/>
+            <p:nvPr/>
+          </p:nvSpPr>
+          <p:spPr>
+            <a:xfrm>
+              <a:off x="2987824" y="1446021"/>
+              <a:ext cx="504056" cy="221541"/>
+            </a:xfrm>
+            <a:custGeom>
+              <a:avLst/>
+              <a:gdLst>
+                <a:gd name="connsiteX0" fmla="*/ 0 w 432048"/>
+                <a:gd name="connsiteY0" fmla="*/ 36005 h 216024"/>
+                <a:gd name="connsiteX1" fmla="*/ 10546 w 432048"/>
+                <a:gd name="connsiteY1" fmla="*/ 10546 h 216024"/>
+                <a:gd name="connsiteX2" fmla="*/ 36005 w 432048"/>
+                <a:gd name="connsiteY2" fmla="*/ 0 h 216024"/>
+                <a:gd name="connsiteX3" fmla="*/ 396043 w 432048"/>
+                <a:gd name="connsiteY3" fmla="*/ 0 h 216024"/>
+                <a:gd name="connsiteX4" fmla="*/ 421502 w 432048"/>
+                <a:gd name="connsiteY4" fmla="*/ 10546 h 216024"/>
+                <a:gd name="connsiteX5" fmla="*/ 432048 w 432048"/>
+                <a:gd name="connsiteY5" fmla="*/ 36005 h 216024"/>
+                <a:gd name="connsiteX6" fmla="*/ 432048 w 432048"/>
+                <a:gd name="connsiteY6" fmla="*/ 180019 h 216024"/>
+                <a:gd name="connsiteX7" fmla="*/ 421502 w 432048"/>
+                <a:gd name="connsiteY7" fmla="*/ 205478 h 216024"/>
+                <a:gd name="connsiteX8" fmla="*/ 396043 w 432048"/>
+                <a:gd name="connsiteY8" fmla="*/ 216024 h 216024"/>
+                <a:gd name="connsiteX9" fmla="*/ 36005 w 432048"/>
+                <a:gd name="connsiteY9" fmla="*/ 216024 h 216024"/>
+                <a:gd name="connsiteX10" fmla="*/ 10546 w 432048"/>
+                <a:gd name="connsiteY10" fmla="*/ 205478 h 216024"/>
+                <a:gd name="connsiteX11" fmla="*/ 0 w 432048"/>
+                <a:gd name="connsiteY11" fmla="*/ 180019 h 216024"/>
+                <a:gd name="connsiteX12" fmla="*/ 0 w 432048"/>
+                <a:gd name="connsiteY12" fmla="*/ 36005 h 216024"/>
+              </a:gdLst>
+              <a:ahLst/>
+              <a:cxnLst>
+                <a:cxn ang="0">
+                  <a:pos x="connsiteX0" y="connsiteY0"/>
+                </a:cxn>
+                <a:cxn ang="0">
+                  <a:pos x="connsiteX1" y="connsiteY1"/>
+                </a:cxn>
+                <a:cxn ang="0">
+                  <a:pos x="connsiteX2" y="connsiteY2"/>
+                </a:cxn>
+                <a:cxn ang="0">
+                  <a:pos x="connsiteX3" y="connsiteY3"/>
+                </a:cxn>
+                <a:cxn ang="0">
+                  <a:pos x="connsiteX4" y="connsiteY4"/>
+                </a:cxn>
+                <a:cxn ang="0">
+                  <a:pos x="connsiteX5" y="connsiteY5"/>
+                </a:cxn>
+                <a:cxn ang="0">
+                  <a:pos x="connsiteX6" y="connsiteY6"/>
+                </a:cxn>
+                <a:cxn ang="0">
+                  <a:pos x="connsiteX7" y="connsiteY7"/>
+                </a:cxn>
+                <a:cxn ang="0">
+                  <a:pos x="connsiteX8" y="connsiteY8"/>
+                </a:cxn>
+                <a:cxn ang="0">
+                  <a:pos x="connsiteX9" y="connsiteY9"/>
+                </a:cxn>
+                <a:cxn ang="0">
+                  <a:pos x="connsiteX10" y="connsiteY10"/>
+                </a:cxn>
+                <a:cxn ang="0">
+                  <a:pos x="connsiteX11" y="connsiteY11"/>
+                </a:cxn>
+                <a:cxn ang="0">
+                  <a:pos x="connsiteX12" y="connsiteY12"/>
+                </a:cxn>
+              </a:cxnLst>
+              <a:rect l="l" t="t" r="r" b="b"/>
+              <a:pathLst>
+                <a:path w="432048" h="216024">
+                  <a:moveTo>
+                    <a:pt x="0" y="36005"/>
+                  </a:moveTo>
+                  <a:cubicBezTo>
+                    <a:pt x="0" y="26456"/>
+                    <a:pt x="3793" y="17298"/>
+                    <a:pt x="10546" y="10546"/>
+                  </a:cubicBezTo>
+                  <a:cubicBezTo>
+                    <a:pt x="17298" y="3794"/>
+                    <a:pt x="26456" y="0"/>
+                    <a:pt x="36005" y="0"/>
+                  </a:cubicBezTo>
+                  <a:lnTo>
+                    <a:pt x="396043" y="0"/>
+                  </a:lnTo>
+                  <a:cubicBezTo>
+                    <a:pt x="405592" y="0"/>
+                    <a:pt x="414750" y="3793"/>
+                    <a:pt x="421502" y="10546"/>
+                  </a:cubicBezTo>
+                  <a:cubicBezTo>
+                    <a:pt x="428254" y="17298"/>
+                    <a:pt x="432048" y="26456"/>
+                    <a:pt x="432048" y="36005"/>
+                  </a:cubicBezTo>
+                  <a:lnTo>
+                    <a:pt x="432048" y="180019"/>
+                  </a:lnTo>
+                  <a:cubicBezTo>
+                    <a:pt x="432048" y="189568"/>
+                    <a:pt x="428255" y="198726"/>
+                    <a:pt x="421502" y="205478"/>
+                  </a:cubicBezTo>
+                  <a:cubicBezTo>
+                    <a:pt x="414750" y="212230"/>
+                    <a:pt x="405592" y="216024"/>
+                    <a:pt x="396043" y="216024"/>
+                  </a:cubicBezTo>
+                  <a:lnTo>
+                    <a:pt x="36005" y="216024"/>
+                  </a:lnTo>
+                  <a:cubicBezTo>
+                    <a:pt x="26456" y="216024"/>
+                    <a:pt x="17298" y="212231"/>
+                    <a:pt x="10546" y="205478"/>
+                  </a:cubicBezTo>
+                  <a:cubicBezTo>
+                    <a:pt x="3794" y="198726"/>
+                    <a:pt x="0" y="189568"/>
+                    <a:pt x="0" y="180019"/>
+                  </a:cubicBezTo>
+                  <a:lnTo>
+                    <a:pt x="0" y="36005"/>
+                  </a:lnTo>
+                  <a:close/>
+                </a:path>
+              </a:pathLst>
+            </a:custGeom>
+            <a:solidFill>
+              <a:schemeClr val="bg1">
+                <a:lumMod val="75000"/>
+                <a:alpha val="34000"/>
+              </a:schemeClr>
+            </a:solidFill>
+            <a:ln>
+              <a:noFill/>
+            </a:ln>
+            <a:effectLst>
+              <a:outerShdw blurRad="50800" dist="50800" algn="ctr" rotWithShape="0">
+                <a:srgbClr val="000000">
+                  <a:alpha val="43137"/>
+                </a:srgbClr>
+              </a:outerShdw>
+            </a:effectLst>
+          </p:spPr>
+          <p:style>
+            <a:lnRef idx="2">
+              <a:schemeClr val="accent1">
+                <a:shade val="50000"/>
+              </a:schemeClr>
+            </a:lnRef>
+            <a:fillRef idx="1">
+              <a:schemeClr val="accent1"/>
+            </a:fillRef>
+            <a:effectRef idx="0">
+              <a:schemeClr val="accent1"/>
+            </a:effectRef>
+            <a:fontRef idx="minor">
+              <a:schemeClr val="lt1"/>
+            </a:fontRef>
+          </p:style>
+          <p:txBody>
+            <a:bodyPr rtlCol="0" anchor="ctr"/>
+            <a:lstStyle/>
+            <a:p>
+              <a:pPr algn="ctr"/>
+              <a:r>
+                <a:rPr lang="zh-CN" altLang="en-US" sz="700" smtClean="0">
+                  <a:latin typeface="微软雅黑" pitchFamily="34" charset="-122"/>
+                  <a:ea typeface="微软雅黑" pitchFamily="34" charset="-122"/>
+                </a:rPr>
+                <a:t>已同</a:t>
+              </a:r>
+              <a:r>
+                <a:rPr lang="zh-CN" altLang="en-US" sz="700" smtClean="0">
+                  <a:latin typeface="微软雅黑" pitchFamily="34" charset="-122"/>
+                  <a:ea typeface="微软雅黑" pitchFamily="34" charset="-122"/>
+                </a:rPr>
+                <a:t>步</a:t>
+              </a:r>
+              <a:endParaRPr lang="zh-CN" altLang="en-US" sz="700">
+                <a:latin typeface="微软雅黑" pitchFamily="34" charset="-122"/>
+                <a:ea typeface="微软雅黑" pitchFamily="34" charset="-122"/>
+              </a:endParaRPr>
+            </a:p>
+          </p:txBody>
+        </p:sp>
+      </p:grpSp>
     </p:spTree>
   </p:cSld>
   <p:clrMapOvr>

</xml_diff>

<commit_message>
update category list ui.
</commit_message>
<xml_diff>
--- a/bg-template.pptx
+++ b/bg-template.pptx
@@ -7,7 +7,8 @@
   <p:sldIdLst>
     <p:sldId id="257" r:id="rId2"/>
     <p:sldId id="258" r:id="rId3"/>
-    <p:sldId id="259" r:id="rId4"/>
+    <p:sldId id="260" r:id="rId4"/>
+    <p:sldId id="259" r:id="rId5"/>
   </p:sldIdLst>
   <p:sldSz cx="9144000" cy="6858000" type="screen4x3"/>
   <p:notesSz cx="6858000" cy="9144000"/>
@@ -3379,6 +3380,133 @@
 </file>
 
 <file path=ppt/slides/slide3.xml><?xml version="1.0" encoding="utf-8"?>
+<p:sld xmlns:a="http://schemas.openxmlformats.org/drawingml/2006/main" xmlns:r="http://schemas.openxmlformats.org/officeDocument/2006/relationships" xmlns:p="http://schemas.openxmlformats.org/presentationml/2006/main">
+  <p:cSld>
+    <p:spTree>
+      <p:nvGrpSpPr>
+        <p:cNvPr id="1" name=""/>
+        <p:cNvGrpSpPr/>
+        <p:nvPr/>
+      </p:nvGrpSpPr>
+      <p:grpSpPr>
+        <a:xfrm>
+          <a:off x="0" y="0"/>
+          <a:ext cx="0" cy="0"/>
+          <a:chOff x="0" y="0"/>
+          <a:chExt cx="0" cy="0"/>
+        </a:xfrm>
+      </p:grpSpPr>
+      <p:sp>
+        <p:nvSpPr>
+          <p:cNvPr id="2" name="圆角矩形 1"/>
+          <p:cNvSpPr/>
+          <p:nvPr/>
+        </p:nvSpPr>
+        <p:spPr>
+          <a:xfrm>
+            <a:off x="4211960" y="3140968"/>
+            <a:ext cx="792088" cy="432048"/>
+          </a:xfrm>
+          <a:prstGeom prst="roundRect">
+            <a:avLst/>
+          </a:prstGeom>
+          <a:solidFill>
+            <a:srgbClr val="3ADCF5">
+              <a:alpha val="25000"/>
+            </a:srgbClr>
+          </a:solidFill>
+          <a:ln>
+            <a:noFill/>
+          </a:ln>
+        </p:spPr>
+        <p:style>
+          <a:lnRef idx="2">
+            <a:schemeClr val="accent1">
+              <a:shade val="50000"/>
+            </a:schemeClr>
+          </a:lnRef>
+          <a:fillRef idx="1">
+            <a:schemeClr val="accent1"/>
+          </a:fillRef>
+          <a:effectRef idx="0">
+            <a:schemeClr val="accent1"/>
+          </a:effectRef>
+          <a:fontRef idx="minor">
+            <a:schemeClr val="lt1"/>
+          </a:fontRef>
+        </p:style>
+        <p:txBody>
+          <a:bodyPr rtlCol="0" anchor="ctr"/>
+          <a:lstStyle/>
+          <a:p>
+            <a:pPr algn="ctr"/>
+            <a:endParaRPr lang="zh-CN" altLang="en-US" sz="900">
+              <a:solidFill>
+                <a:schemeClr val="bg1">
+                  <a:lumMod val="75000"/>
+                </a:schemeClr>
+              </a:solidFill>
+              <a:latin typeface="微软雅黑" pitchFamily="34" charset="-122"/>
+              <a:ea typeface="微软雅黑" pitchFamily="34" charset="-122"/>
+            </a:endParaRPr>
+          </a:p>
+        </p:txBody>
+      </p:sp>
+      <p:sp>
+        <p:nvSpPr>
+          <p:cNvPr id="3" name="TextBox 2"/>
+          <p:cNvSpPr txBox="1"/>
+          <p:nvPr/>
+        </p:nvSpPr>
+        <p:spPr>
+          <a:xfrm>
+            <a:off x="3995936" y="3789040"/>
+            <a:ext cx="1224136" cy="369332"/>
+          </a:xfrm>
+          <a:prstGeom prst="rect">
+            <a:avLst/>
+          </a:prstGeom>
+          <a:noFill/>
+        </p:spPr>
+        <p:txBody>
+          <a:bodyPr wrap="square" rtlCol="0">
+            <a:spAutoFit/>
+          </a:bodyPr>
+          <a:lstStyle/>
+          <a:p>
+            <a:r>
+              <a:rPr lang="zh-CN" altLang="en-US" b="1" smtClean="0">
+                <a:solidFill>
+                  <a:schemeClr val="bg1"/>
+                </a:solidFill>
+              </a:rPr>
+              <a:t>同</a:t>
+            </a:r>
+            <a:r>
+              <a:rPr lang="zh-CN" altLang="en-US" b="1" smtClean="0">
+                <a:solidFill>
+                  <a:schemeClr val="bg1"/>
+                </a:solidFill>
+              </a:rPr>
+              <a:t>步背景</a:t>
+            </a:r>
+            <a:endParaRPr lang="zh-CN" altLang="en-US" b="1">
+              <a:solidFill>
+                <a:schemeClr val="bg1"/>
+              </a:solidFill>
+            </a:endParaRPr>
+          </a:p>
+        </p:txBody>
+      </p:sp>
+    </p:spTree>
+  </p:cSld>
+  <p:clrMapOvr>
+    <a:masterClrMapping/>
+  </p:clrMapOvr>
+</p:sld>
+</file>
+
+<file path=ppt/slides/slide4.xml><?xml version="1.0" encoding="utf-8"?>
 <p:sld xmlns:a="http://schemas.openxmlformats.org/drawingml/2006/main" xmlns:r="http://schemas.openxmlformats.org/officeDocument/2006/relationships" xmlns:p="http://schemas.openxmlformats.org/presentationml/2006/main">
   <p:cSld>
     <p:spTree>
@@ -3934,14 +4062,7 @@
                   <a:latin typeface="微软雅黑" pitchFamily="34" charset="-122"/>
                   <a:ea typeface="微软雅黑" pitchFamily="34" charset="-122"/>
                 </a:rPr>
-                <a:t>已同</a:t>
-              </a:r>
-              <a:r>
-                <a:rPr lang="zh-CN" altLang="en-US" sz="700" smtClean="0">
-                  <a:latin typeface="微软雅黑" pitchFamily="34" charset="-122"/>
-                  <a:ea typeface="微软雅黑" pitchFamily="34" charset="-122"/>
-                </a:rPr>
-                <a:t>步</a:t>
+                <a:t>已同步</a:t>
               </a:r>
               <a:endParaRPr lang="zh-CN" altLang="en-US" sz="700">
                 <a:latin typeface="微软雅黑" pitchFamily="34" charset="-122"/>

</xml_diff>

<commit_message>
add the button of adding tag.
</commit_message>
<xml_diff>
--- a/bg-template.pptx
+++ b/bg-template.pptx
@@ -8,7 +8,8 @@
     <p:sldId id="257" r:id="rId2"/>
     <p:sldId id="258" r:id="rId3"/>
     <p:sldId id="260" r:id="rId4"/>
-    <p:sldId id="259" r:id="rId5"/>
+    <p:sldId id="261" r:id="rId5"/>
+    <p:sldId id="259" r:id="rId6"/>
   </p:sldIdLst>
   <p:sldSz cx="9144000" cy="6858000" type="screen4x3"/>
   <p:notesSz cx="6858000" cy="9144000"/>
@@ -292,7 +293,7 @@
             <a:fld id="{73FC10DC-F744-4F62-ACA5-274CC8B19AAC}" type="datetimeFigureOut">
               <a:rPr lang="zh-CN" altLang="en-US" smtClean="0"/>
               <a:pPr/>
-              <a:t>2013/1/23</a:t>
+              <a:t>2013/1/29</a:t>
             </a:fld>
             <a:endParaRPr lang="zh-CN" altLang="en-US"/>
           </a:p>
@@ -459,7 +460,7 @@
             <a:fld id="{73FC10DC-F744-4F62-ACA5-274CC8B19AAC}" type="datetimeFigureOut">
               <a:rPr lang="zh-CN" altLang="en-US" smtClean="0"/>
               <a:pPr/>
-              <a:t>2013/1/23</a:t>
+              <a:t>2013/1/29</a:t>
             </a:fld>
             <a:endParaRPr lang="zh-CN" altLang="en-US"/>
           </a:p>
@@ -636,7 +637,7 @@
             <a:fld id="{73FC10DC-F744-4F62-ACA5-274CC8B19AAC}" type="datetimeFigureOut">
               <a:rPr lang="zh-CN" altLang="en-US" smtClean="0"/>
               <a:pPr/>
-              <a:t>2013/1/23</a:t>
+              <a:t>2013/1/29</a:t>
             </a:fld>
             <a:endParaRPr lang="zh-CN" altLang="en-US"/>
           </a:p>
@@ -803,7 +804,7 @@
             <a:fld id="{73FC10DC-F744-4F62-ACA5-274CC8B19AAC}" type="datetimeFigureOut">
               <a:rPr lang="zh-CN" altLang="en-US" smtClean="0"/>
               <a:pPr/>
-              <a:t>2013/1/23</a:t>
+              <a:t>2013/1/29</a:t>
             </a:fld>
             <a:endParaRPr lang="zh-CN" altLang="en-US"/>
           </a:p>
@@ -1046,7 +1047,7 @@
             <a:fld id="{73FC10DC-F744-4F62-ACA5-274CC8B19AAC}" type="datetimeFigureOut">
               <a:rPr lang="zh-CN" altLang="en-US" smtClean="0"/>
               <a:pPr/>
-              <a:t>2013/1/23</a:t>
+              <a:t>2013/1/29</a:t>
             </a:fld>
             <a:endParaRPr lang="zh-CN" altLang="en-US"/>
           </a:p>
@@ -1331,7 +1332,7 @@
             <a:fld id="{73FC10DC-F744-4F62-ACA5-274CC8B19AAC}" type="datetimeFigureOut">
               <a:rPr lang="zh-CN" altLang="en-US" smtClean="0"/>
               <a:pPr/>
-              <a:t>2013/1/23</a:t>
+              <a:t>2013/1/29</a:t>
             </a:fld>
             <a:endParaRPr lang="zh-CN" altLang="en-US"/>
           </a:p>
@@ -1750,7 +1751,7 @@
             <a:fld id="{73FC10DC-F744-4F62-ACA5-274CC8B19AAC}" type="datetimeFigureOut">
               <a:rPr lang="zh-CN" altLang="en-US" smtClean="0"/>
               <a:pPr/>
-              <a:t>2013/1/23</a:t>
+              <a:t>2013/1/29</a:t>
             </a:fld>
             <a:endParaRPr lang="zh-CN" altLang="en-US"/>
           </a:p>
@@ -1865,7 +1866,7 @@
             <a:fld id="{73FC10DC-F744-4F62-ACA5-274CC8B19AAC}" type="datetimeFigureOut">
               <a:rPr lang="zh-CN" altLang="en-US" smtClean="0"/>
               <a:pPr/>
-              <a:t>2013/1/23</a:t>
+              <a:t>2013/1/29</a:t>
             </a:fld>
             <a:endParaRPr lang="zh-CN" altLang="en-US"/>
           </a:p>
@@ -1957,7 +1958,7 @@
             <a:fld id="{73FC10DC-F744-4F62-ACA5-274CC8B19AAC}" type="datetimeFigureOut">
               <a:rPr lang="zh-CN" altLang="en-US" smtClean="0"/>
               <a:pPr/>
-              <a:t>2013/1/23</a:t>
+              <a:t>2013/1/29</a:t>
             </a:fld>
             <a:endParaRPr lang="zh-CN" altLang="en-US"/>
           </a:p>
@@ -2231,7 +2232,7 @@
             <a:fld id="{73FC10DC-F744-4F62-ACA5-274CC8B19AAC}" type="datetimeFigureOut">
               <a:rPr lang="zh-CN" altLang="en-US" smtClean="0"/>
               <a:pPr/>
-              <a:t>2013/1/23</a:t>
+              <a:t>2013/1/29</a:t>
             </a:fld>
             <a:endParaRPr lang="zh-CN" altLang="en-US"/>
           </a:p>
@@ -2481,7 +2482,7 @@
             <a:fld id="{73FC10DC-F744-4F62-ACA5-274CC8B19AAC}" type="datetimeFigureOut">
               <a:rPr lang="zh-CN" altLang="en-US" smtClean="0"/>
               <a:pPr/>
-              <a:t>2013/1/23</a:t>
+              <a:t>2013/1/29</a:t>
             </a:fld>
             <a:endParaRPr lang="zh-CN" altLang="en-US"/>
           </a:p>
@@ -2697,7 +2698,7 @@
             <a:fld id="{73FC10DC-F744-4F62-ACA5-274CC8B19AAC}" type="datetimeFigureOut">
               <a:rPr lang="zh-CN" altLang="en-US" smtClean="0"/>
               <a:pPr/>
-              <a:t>2013/1/23</a:t>
+              <a:t>2013/1/29</a:t>
             </a:fld>
             <a:endParaRPr lang="zh-CN" altLang="en-US"/>
           </a:p>
@@ -3382,6 +3383,14 @@
 <file path=ppt/slides/slide3.xml><?xml version="1.0" encoding="utf-8"?>
 <p:sld xmlns:a="http://schemas.openxmlformats.org/drawingml/2006/main" xmlns:r="http://schemas.openxmlformats.org/officeDocument/2006/relationships" xmlns:p="http://schemas.openxmlformats.org/presentationml/2006/main">
   <p:cSld>
+    <p:bg>
+      <p:bgPr>
+        <a:solidFill>
+          <a:schemeClr val="bg1"/>
+        </a:solidFill>
+        <a:effectLst/>
+      </p:bgPr>
+    </p:bg>
     <p:spTree>
       <p:nvGrpSpPr>
         <p:cNvPr id="1" name=""/>
@@ -3411,9 +3420,141 @@
             <a:avLst/>
           </a:prstGeom>
           <a:solidFill>
-            <a:srgbClr val="3ADCF5">
-              <a:alpha val="25000"/>
-            </a:srgbClr>
+            <a:schemeClr val="bg1">
+              <a:lumMod val="85000"/>
+              <a:alpha val="35000"/>
+            </a:schemeClr>
+          </a:solidFill>
+          <a:ln>
+            <a:noFill/>
+          </a:ln>
+          <a:effectLst/>
+          <a:scene3d>
+            <a:camera prst="orthographicFront">
+              <a:rot lat="0" lon="0" rev="0"/>
+            </a:camera>
+            <a:lightRig rig="chilly" dir="t">
+              <a:rot lat="0" lon="0" rev="18480000"/>
+            </a:lightRig>
+          </a:scene3d>
+          <a:sp3d prstMaterial="clear"/>
+        </p:spPr>
+        <p:style>
+          <a:lnRef idx="2">
+            <a:schemeClr val="accent1">
+              <a:shade val="50000"/>
+            </a:schemeClr>
+          </a:lnRef>
+          <a:fillRef idx="1">
+            <a:schemeClr val="accent1"/>
+          </a:fillRef>
+          <a:effectRef idx="0">
+            <a:schemeClr val="accent1"/>
+          </a:effectRef>
+          <a:fontRef idx="minor">
+            <a:schemeClr val="lt1"/>
+          </a:fontRef>
+        </p:style>
+        <p:txBody>
+          <a:bodyPr rtlCol="0" anchor="ctr"/>
+          <a:lstStyle/>
+          <a:p>
+            <a:pPr algn="ctr"/>
+            <a:endParaRPr lang="zh-CN" altLang="en-US" sz="900">
+              <a:solidFill>
+                <a:schemeClr val="bg1">
+                  <a:lumMod val="95000"/>
+                </a:schemeClr>
+              </a:solidFill>
+              <a:latin typeface="微软雅黑" pitchFamily="34" charset="-122"/>
+              <a:ea typeface="微软雅黑" pitchFamily="34" charset="-122"/>
+            </a:endParaRPr>
+          </a:p>
+        </p:txBody>
+      </p:sp>
+      <p:sp>
+        <p:nvSpPr>
+          <p:cNvPr id="3" name="TextBox 2"/>
+          <p:cNvSpPr txBox="1"/>
+          <p:nvPr/>
+        </p:nvSpPr>
+        <p:spPr>
+          <a:xfrm>
+            <a:off x="3995936" y="3789040"/>
+            <a:ext cx="1224136" cy="369332"/>
+          </a:xfrm>
+          <a:prstGeom prst="rect">
+            <a:avLst/>
+          </a:prstGeom>
+          <a:noFill/>
+        </p:spPr>
+        <p:txBody>
+          <a:bodyPr wrap="square" rtlCol="0">
+            <a:spAutoFit/>
+          </a:bodyPr>
+          <a:lstStyle/>
+          <a:p>
+            <a:r>
+              <a:rPr lang="zh-CN" altLang="en-US" b="1" smtClean="0"/>
+              <a:t>同步背景</a:t>
+            </a:r>
+            <a:endParaRPr lang="zh-CN" altLang="en-US" b="1"/>
+          </a:p>
+        </p:txBody>
+      </p:sp>
+    </p:spTree>
+  </p:cSld>
+  <p:clrMapOvr>
+    <a:masterClrMapping/>
+  </p:clrMapOvr>
+</p:sld>
+</file>
+
+<file path=ppt/slides/slide4.xml><?xml version="1.0" encoding="utf-8"?>
+<p:sld xmlns:a="http://schemas.openxmlformats.org/drawingml/2006/main" xmlns:r="http://schemas.openxmlformats.org/officeDocument/2006/relationships" xmlns:p="http://schemas.openxmlformats.org/presentationml/2006/main">
+  <p:cSld>
+    <p:bg>
+      <p:bgPr>
+        <a:solidFill>
+          <a:schemeClr val="bg1"/>
+        </a:solidFill>
+        <a:effectLst/>
+      </p:bgPr>
+    </p:bg>
+    <p:spTree>
+      <p:nvGrpSpPr>
+        <p:cNvPr id="1" name=""/>
+        <p:cNvGrpSpPr/>
+        <p:nvPr/>
+      </p:nvGrpSpPr>
+      <p:grpSpPr>
+        <a:xfrm>
+          <a:off x="0" y="0"/>
+          <a:ext cx="0" cy="0"/>
+          <a:chOff x="0" y="0"/>
+          <a:chExt cx="0" cy="0"/>
+        </a:xfrm>
+      </p:grpSpPr>
+      <p:sp>
+        <p:nvSpPr>
+          <p:cNvPr id="5" name="矩形 4"/>
+          <p:cNvSpPr>
+            <a:spLocks noChangeAspect="1"/>
+          </p:cNvSpPr>
+          <p:nvPr/>
+        </p:nvSpPr>
+        <p:spPr>
+          <a:xfrm>
+            <a:off x="2123728" y="2564904"/>
+            <a:ext cx="3024336" cy="1008112"/>
+          </a:xfrm>
+          <a:prstGeom prst="rect">
+            <a:avLst/>
+          </a:prstGeom>
+          <a:solidFill>
+            <a:schemeClr val="bg1">
+              <a:lumMod val="95000"/>
+            </a:schemeClr>
           </a:solidFill>
           <a:ln>
             <a:noFill/>
@@ -3440,64 +3581,134 @@
           <a:lstStyle/>
           <a:p>
             <a:pPr algn="ctr"/>
-            <a:endParaRPr lang="zh-CN" altLang="en-US" sz="900">
-              <a:solidFill>
-                <a:schemeClr val="bg1">
-                  <a:lumMod val="75000"/>
-                </a:schemeClr>
-              </a:solidFill>
-              <a:latin typeface="微软雅黑" pitchFamily="34" charset="-122"/>
-              <a:ea typeface="微软雅黑" pitchFamily="34" charset="-122"/>
-            </a:endParaRPr>
-          </a:p>
-        </p:txBody>
-      </p:sp>
-      <p:sp>
-        <p:nvSpPr>
-          <p:cNvPr id="3" name="TextBox 2"/>
-          <p:cNvSpPr txBox="1"/>
+            <a:endParaRPr lang="zh-CN" altLang="en-US"/>
+          </a:p>
+        </p:txBody>
+      </p:sp>
+      <p:grpSp>
+        <p:nvGrpSpPr>
+          <p:cNvPr id="4" name="组合 3"/>
+          <p:cNvGrpSpPr/>
           <p:nvPr/>
-        </p:nvSpPr>
-        <p:spPr>
+        </p:nvGrpSpPr>
+        <p:grpSpPr>
           <a:xfrm>
-            <a:off x="3995936" y="3789040"/>
-            <a:ext cx="1224136" cy="369332"/>
+            <a:off x="3419872" y="2852936"/>
+            <a:ext cx="432048" cy="432048"/>
+            <a:chOff x="3419872" y="2852936"/>
+            <a:chExt cx="432048" cy="432048"/>
           </a:xfrm>
-          <a:prstGeom prst="rect">
-            <a:avLst/>
-          </a:prstGeom>
-          <a:noFill/>
-        </p:spPr>
-        <p:txBody>
-          <a:bodyPr wrap="square" rtlCol="0">
-            <a:spAutoFit/>
-          </a:bodyPr>
-          <a:lstStyle/>
-          <a:p>
-            <a:r>
-              <a:rPr lang="zh-CN" altLang="en-US" b="1" smtClean="0">
+          <a:solidFill>
+            <a:schemeClr val="bg1">
+              <a:lumMod val="75000"/>
+            </a:schemeClr>
+          </a:solidFill>
+        </p:grpSpPr>
+        <p:sp>
+          <p:nvSpPr>
+            <p:cNvPr id="2" name="椭圆 1"/>
+            <p:cNvSpPr/>
+            <p:nvPr/>
+          </p:nvSpPr>
+          <p:spPr>
+            <a:xfrm>
+              <a:off x="3419872" y="2852936"/>
+              <a:ext cx="432048" cy="432048"/>
+            </a:xfrm>
+            <a:prstGeom prst="ellipse">
+              <a:avLst/>
+            </a:prstGeom>
+            <a:grpFill/>
+            <a:ln>
+              <a:noFill/>
+            </a:ln>
+          </p:spPr>
+          <p:style>
+            <a:lnRef idx="2">
+              <a:schemeClr val="accent1">
+                <a:shade val="50000"/>
+              </a:schemeClr>
+            </a:lnRef>
+            <a:fillRef idx="1">
+              <a:schemeClr val="accent1"/>
+            </a:fillRef>
+            <a:effectRef idx="0">
+              <a:schemeClr val="accent1"/>
+            </a:effectRef>
+            <a:fontRef idx="minor">
+              <a:schemeClr val="lt1"/>
+            </a:fontRef>
+          </p:style>
+          <p:txBody>
+            <a:bodyPr rtlCol="0" anchor="ctr"/>
+            <a:lstStyle/>
+            <a:p>
+              <a:pPr algn="ctr"/>
+              <a:endParaRPr lang="zh-CN" altLang="en-US">
                 <a:solidFill>
-                  <a:schemeClr val="bg1"/>
+                  <a:schemeClr val="bg1">
+                    <a:lumMod val="85000"/>
+                  </a:schemeClr>
                 </a:solidFill>
-              </a:rPr>
-              <a:t>同</a:t>
-            </a:r>
-            <a:r>
-              <a:rPr lang="zh-CN" altLang="en-US" b="1" smtClean="0">
+              </a:endParaRPr>
+            </a:p>
+          </p:txBody>
+        </p:sp>
+        <p:sp>
+          <p:nvSpPr>
+            <p:cNvPr id="3" name="加号 2"/>
+            <p:cNvSpPr/>
+            <p:nvPr/>
+          </p:nvSpPr>
+          <p:spPr>
+            <a:xfrm>
+              <a:off x="3491880" y="2924944"/>
+              <a:ext cx="288032" cy="288032"/>
+            </a:xfrm>
+            <a:prstGeom prst="mathPlus">
+              <a:avLst/>
+            </a:prstGeom>
+            <a:solidFill>
+              <a:schemeClr val="bg1">
+                <a:lumMod val="95000"/>
+              </a:schemeClr>
+            </a:solidFill>
+            <a:ln>
+              <a:noFill/>
+            </a:ln>
+          </p:spPr>
+          <p:style>
+            <a:lnRef idx="2">
+              <a:schemeClr val="accent1">
+                <a:shade val="50000"/>
+              </a:schemeClr>
+            </a:lnRef>
+            <a:fillRef idx="1">
+              <a:schemeClr val="accent1"/>
+            </a:fillRef>
+            <a:effectRef idx="0">
+              <a:schemeClr val="accent1"/>
+            </a:effectRef>
+            <a:fontRef idx="minor">
+              <a:schemeClr val="lt1"/>
+            </a:fontRef>
+          </p:style>
+          <p:txBody>
+            <a:bodyPr rtlCol="0" anchor="ctr"/>
+            <a:lstStyle/>
+            <a:p>
+              <a:pPr algn="ctr"/>
+              <a:endParaRPr lang="zh-CN" altLang="en-US">
                 <a:solidFill>
-                  <a:schemeClr val="bg1"/>
+                  <a:schemeClr val="bg1">
+                    <a:lumMod val="85000"/>
+                  </a:schemeClr>
                 </a:solidFill>
-              </a:rPr>
-              <a:t>步背景</a:t>
-            </a:r>
-            <a:endParaRPr lang="zh-CN" altLang="en-US" b="1">
-              <a:solidFill>
-                <a:schemeClr val="bg1"/>
-              </a:solidFill>
-            </a:endParaRPr>
-          </a:p>
-        </p:txBody>
-      </p:sp>
+              </a:endParaRPr>
+            </a:p>
+          </p:txBody>
+        </p:sp>
+      </p:grpSp>
     </p:spTree>
   </p:cSld>
   <p:clrMapOvr>
@@ -3506,7 +3717,7 @@
 </p:sld>
 </file>
 
-<file path=ppt/slides/slide4.xml><?xml version="1.0" encoding="utf-8"?>
+<file path=ppt/slides/slide5.xml><?xml version="1.0" encoding="utf-8"?>
 <p:sld xmlns:a="http://schemas.openxmlformats.org/drawingml/2006/main" xmlns:r="http://schemas.openxmlformats.org/officeDocument/2006/relationships" xmlns:p="http://schemas.openxmlformats.org/presentationml/2006/main">
   <p:cSld>
     <p:spTree>

</xml_diff>

<commit_message>
update icon and splash image.
</commit_message>
<xml_diff>
--- a/bg-template.pptx
+++ b/bg-template.pptx
@@ -7,9 +7,13 @@
   <p:sldIdLst>
     <p:sldId id="257" r:id="rId2"/>
     <p:sldId id="258" r:id="rId3"/>
-    <p:sldId id="260" r:id="rId4"/>
-    <p:sldId id="261" r:id="rId5"/>
-    <p:sldId id="259" r:id="rId6"/>
+    <p:sldId id="265" r:id="rId4"/>
+    <p:sldId id="262" r:id="rId5"/>
+    <p:sldId id="266" r:id="rId6"/>
+    <p:sldId id="264" r:id="rId7"/>
+    <p:sldId id="260" r:id="rId8"/>
+    <p:sldId id="261" r:id="rId9"/>
+    <p:sldId id="259" r:id="rId10"/>
   </p:sldIdLst>
   <p:sldSz cx="9144000" cy="6858000" type="screen4x3"/>
   <p:notesSz cx="6858000" cy="9144000"/>
@@ -293,7 +297,7 @@
             <a:fld id="{73FC10DC-F744-4F62-ACA5-274CC8B19AAC}" type="datetimeFigureOut">
               <a:rPr lang="zh-CN" altLang="en-US" smtClean="0"/>
               <a:pPr/>
-              <a:t>2013/1/29</a:t>
+              <a:t>2013/6/7</a:t>
             </a:fld>
             <a:endParaRPr lang="zh-CN" altLang="en-US"/>
           </a:p>
@@ -460,7 +464,7 @@
             <a:fld id="{73FC10DC-F744-4F62-ACA5-274CC8B19AAC}" type="datetimeFigureOut">
               <a:rPr lang="zh-CN" altLang="en-US" smtClean="0"/>
               <a:pPr/>
-              <a:t>2013/1/29</a:t>
+              <a:t>2013/6/7</a:t>
             </a:fld>
             <a:endParaRPr lang="zh-CN" altLang="en-US"/>
           </a:p>
@@ -637,7 +641,7 @@
             <a:fld id="{73FC10DC-F744-4F62-ACA5-274CC8B19AAC}" type="datetimeFigureOut">
               <a:rPr lang="zh-CN" altLang="en-US" smtClean="0"/>
               <a:pPr/>
-              <a:t>2013/1/29</a:t>
+              <a:t>2013/6/7</a:t>
             </a:fld>
             <a:endParaRPr lang="zh-CN" altLang="en-US"/>
           </a:p>
@@ -804,7 +808,7 @@
             <a:fld id="{73FC10DC-F744-4F62-ACA5-274CC8B19AAC}" type="datetimeFigureOut">
               <a:rPr lang="zh-CN" altLang="en-US" smtClean="0"/>
               <a:pPr/>
-              <a:t>2013/1/29</a:t>
+              <a:t>2013/6/7</a:t>
             </a:fld>
             <a:endParaRPr lang="zh-CN" altLang="en-US"/>
           </a:p>
@@ -1047,7 +1051,7 @@
             <a:fld id="{73FC10DC-F744-4F62-ACA5-274CC8B19AAC}" type="datetimeFigureOut">
               <a:rPr lang="zh-CN" altLang="en-US" smtClean="0"/>
               <a:pPr/>
-              <a:t>2013/1/29</a:t>
+              <a:t>2013/6/7</a:t>
             </a:fld>
             <a:endParaRPr lang="zh-CN" altLang="en-US"/>
           </a:p>
@@ -1332,7 +1336,7 @@
             <a:fld id="{73FC10DC-F744-4F62-ACA5-274CC8B19AAC}" type="datetimeFigureOut">
               <a:rPr lang="zh-CN" altLang="en-US" smtClean="0"/>
               <a:pPr/>
-              <a:t>2013/1/29</a:t>
+              <a:t>2013/6/7</a:t>
             </a:fld>
             <a:endParaRPr lang="zh-CN" altLang="en-US"/>
           </a:p>
@@ -1751,7 +1755,7 @@
             <a:fld id="{73FC10DC-F744-4F62-ACA5-274CC8B19AAC}" type="datetimeFigureOut">
               <a:rPr lang="zh-CN" altLang="en-US" smtClean="0"/>
               <a:pPr/>
-              <a:t>2013/1/29</a:t>
+              <a:t>2013/6/7</a:t>
             </a:fld>
             <a:endParaRPr lang="zh-CN" altLang="en-US"/>
           </a:p>
@@ -1866,7 +1870,7 @@
             <a:fld id="{73FC10DC-F744-4F62-ACA5-274CC8B19AAC}" type="datetimeFigureOut">
               <a:rPr lang="zh-CN" altLang="en-US" smtClean="0"/>
               <a:pPr/>
-              <a:t>2013/1/29</a:t>
+              <a:t>2013/6/7</a:t>
             </a:fld>
             <a:endParaRPr lang="zh-CN" altLang="en-US"/>
           </a:p>
@@ -1958,7 +1962,7 @@
             <a:fld id="{73FC10DC-F744-4F62-ACA5-274CC8B19AAC}" type="datetimeFigureOut">
               <a:rPr lang="zh-CN" altLang="en-US" smtClean="0"/>
               <a:pPr/>
-              <a:t>2013/1/29</a:t>
+              <a:t>2013/6/7</a:t>
             </a:fld>
             <a:endParaRPr lang="zh-CN" altLang="en-US"/>
           </a:p>
@@ -2232,7 +2236,7 @@
             <a:fld id="{73FC10DC-F744-4F62-ACA5-274CC8B19AAC}" type="datetimeFigureOut">
               <a:rPr lang="zh-CN" altLang="en-US" smtClean="0"/>
               <a:pPr/>
-              <a:t>2013/1/29</a:t>
+              <a:t>2013/6/7</a:t>
             </a:fld>
             <a:endParaRPr lang="zh-CN" altLang="en-US"/>
           </a:p>
@@ -2482,7 +2486,7 @@
             <a:fld id="{73FC10DC-F744-4F62-ACA5-274CC8B19AAC}" type="datetimeFigureOut">
               <a:rPr lang="zh-CN" altLang="en-US" smtClean="0"/>
               <a:pPr/>
-              <a:t>2013/1/29</a:t>
+              <a:t>2013/6/7</a:t>
             </a:fld>
             <a:endParaRPr lang="zh-CN" altLang="en-US"/>
           </a:p>
@@ -2698,7 +2702,7 @@
             <a:fld id="{73FC10DC-F744-4F62-ACA5-274CC8B19AAC}" type="datetimeFigureOut">
               <a:rPr lang="zh-CN" altLang="en-US" smtClean="0"/>
               <a:pPr/>
-              <a:t>2013/1/29</a:t>
+              <a:t>2013/6/7</a:t>
             </a:fld>
             <a:endParaRPr lang="zh-CN" altLang="en-US"/>
           </a:p>
@@ -3204,32 +3208,463 @@
           <a:chExt cx="0" cy="0"/>
         </a:xfrm>
       </p:grpSpPr>
+      <p:sp>
+        <p:nvSpPr>
+          <p:cNvPr id="4" name="矩形 3"/>
+          <p:cNvSpPr/>
+          <p:nvPr/>
+        </p:nvSpPr>
+        <p:spPr>
+          <a:xfrm>
+            <a:off x="2699792" y="164637"/>
+            <a:ext cx="3600400" cy="6000667"/>
+          </a:xfrm>
+          <a:prstGeom prst="rect">
+            <a:avLst/>
+          </a:prstGeom>
+          <a:gradFill flip="none" rotWithShape="1">
+            <a:gsLst>
+              <a:gs pos="0">
+                <a:schemeClr val="accent1">
+                  <a:lumMod val="60000"/>
+                  <a:lumOff val="40000"/>
+                </a:schemeClr>
+              </a:gs>
+              <a:gs pos="65000">
+                <a:srgbClr val="00B0F0"/>
+              </a:gs>
+            </a:gsLst>
+            <a:path path="circle">
+              <a:fillToRect l="50000" t="50000" r="50000" b="50000"/>
+            </a:path>
+            <a:tileRect/>
+          </a:gradFill>
+          <a:ln>
+            <a:noFill/>
+          </a:ln>
+        </p:spPr>
+        <p:style>
+          <a:lnRef idx="2">
+            <a:schemeClr val="accent1">
+              <a:shade val="50000"/>
+            </a:schemeClr>
+          </a:lnRef>
+          <a:fillRef idx="1">
+            <a:schemeClr val="accent1"/>
+          </a:fillRef>
+          <a:effectRef idx="0">
+            <a:schemeClr val="accent1"/>
+          </a:effectRef>
+          <a:fontRef idx="minor">
+            <a:schemeClr val="lt1"/>
+          </a:fontRef>
+        </p:style>
+        <p:txBody>
+          <a:bodyPr rtlCol="0" anchor="ctr"/>
+          <a:lstStyle/>
+          <a:p>
+            <a:pPr algn="ctr"/>
+            <a:endParaRPr lang="zh-CN" altLang="en-US"/>
+          </a:p>
+        </p:txBody>
+      </p:sp>
+      <p:sp>
+        <p:nvSpPr>
+          <p:cNvPr id="5" name="TextBox 4"/>
+          <p:cNvSpPr txBox="1"/>
+          <p:nvPr/>
+        </p:nvSpPr>
+        <p:spPr>
+          <a:xfrm>
+            <a:off x="2699792" y="2708920"/>
+            <a:ext cx="3600400" cy="523220"/>
+          </a:xfrm>
+          <a:prstGeom prst="rect">
+            <a:avLst/>
+          </a:prstGeom>
+          <a:noFill/>
+        </p:spPr>
+        <p:txBody>
+          <a:bodyPr wrap="square" rtlCol="0">
+            <a:spAutoFit/>
+          </a:bodyPr>
+          <a:lstStyle/>
+          <a:p>
+            <a:pPr algn="ctr"/>
+            <a:r>
+              <a:rPr lang="zh-CN" altLang="en-US" sz="2800" b="1" smtClean="0">
+                <a:solidFill>
+                  <a:schemeClr val="bg1"/>
+                </a:solidFill>
+                <a:latin typeface="微软雅黑" pitchFamily="34" charset="-122"/>
+                <a:ea typeface="微软雅黑" pitchFamily="34" charset="-122"/>
+              </a:rPr>
+              <a:t>微新闻</a:t>
+            </a:r>
+            <a:endParaRPr lang="zh-CN" altLang="en-US" sz="2800" b="1">
+              <a:solidFill>
+                <a:schemeClr val="bg1"/>
+              </a:solidFill>
+              <a:latin typeface="微软雅黑" pitchFamily="34" charset="-122"/>
+              <a:ea typeface="微软雅黑" pitchFamily="34" charset="-122"/>
+            </a:endParaRPr>
+          </a:p>
+        </p:txBody>
+      </p:sp>
+      <p:sp>
+        <p:nvSpPr>
+          <p:cNvPr id="6" name="TextBox 5"/>
+          <p:cNvSpPr txBox="1"/>
+          <p:nvPr/>
+        </p:nvSpPr>
+        <p:spPr>
+          <a:xfrm>
+            <a:off x="2699792" y="3234462"/>
+            <a:ext cx="3600400" cy="338554"/>
+          </a:xfrm>
+          <a:prstGeom prst="rect">
+            <a:avLst/>
+          </a:prstGeom>
+          <a:noFill/>
+        </p:spPr>
+        <p:txBody>
+          <a:bodyPr wrap="square" rtlCol="0">
+            <a:spAutoFit/>
+          </a:bodyPr>
+          <a:lstStyle/>
+          <a:p>
+            <a:pPr algn="ctr"/>
+            <a:r>
+              <a:rPr lang="zh-CN" altLang="en-US" sz="1600" b="1" smtClean="0">
+                <a:latin typeface="幼圆" pitchFamily="49" charset="-122"/>
+                <a:ea typeface="幼圆" pitchFamily="49" charset="-122"/>
+              </a:rPr>
+              <a:t>              </a:t>
+            </a:r>
+            <a:r>
+              <a:rPr lang="zh-CN" altLang="en-US" sz="1600" b="1" smtClean="0">
+                <a:solidFill>
+                  <a:schemeClr val="bg1"/>
+                </a:solidFill>
+                <a:latin typeface="幼圆" pitchFamily="49" charset="-122"/>
+                <a:ea typeface="幼圆" pitchFamily="49" charset="-122"/>
+              </a:rPr>
+              <a:t>更快地掌握资讯</a:t>
+            </a:r>
+            <a:endParaRPr lang="zh-CN" altLang="en-US" sz="1600" b="1">
+              <a:solidFill>
+                <a:schemeClr val="bg1"/>
+              </a:solidFill>
+              <a:latin typeface="幼圆" pitchFamily="49" charset="-122"/>
+              <a:ea typeface="幼圆" pitchFamily="49" charset="-122"/>
+            </a:endParaRPr>
+          </a:p>
+        </p:txBody>
+      </p:sp>
+    </p:spTree>
+  </p:cSld>
+  <p:clrMapOvr>
+    <a:masterClrMapping/>
+  </p:clrMapOvr>
+</p:sld>
+</file>
+
+<file path=ppt/slides/slide3.xml><?xml version="1.0" encoding="utf-8"?>
+<p:sld xmlns:a="http://schemas.openxmlformats.org/drawingml/2006/main" xmlns:r="http://schemas.openxmlformats.org/officeDocument/2006/relationships" xmlns:p="http://schemas.openxmlformats.org/presentationml/2006/main">
+  <p:cSld>
+    <p:spTree>
+      <p:nvGrpSpPr>
+        <p:cNvPr id="1" name=""/>
+        <p:cNvGrpSpPr/>
+        <p:nvPr/>
+      </p:nvGrpSpPr>
+      <p:grpSpPr>
+        <a:xfrm>
+          <a:off x="0" y="0"/>
+          <a:ext cx="0" cy="0"/>
+          <a:chOff x="0" y="0"/>
+          <a:chExt cx="0" cy="0"/>
+        </a:xfrm>
+      </p:grpSpPr>
+      <p:sp>
+        <p:nvSpPr>
+          <p:cNvPr id="4" name="矩形 3"/>
+          <p:cNvSpPr/>
+          <p:nvPr/>
+        </p:nvSpPr>
+        <p:spPr>
+          <a:xfrm>
+            <a:off x="2699792" y="164637"/>
+            <a:ext cx="3600400" cy="6000667"/>
+          </a:xfrm>
+          <a:prstGeom prst="rect">
+            <a:avLst/>
+          </a:prstGeom>
+          <a:gradFill flip="none" rotWithShape="1">
+            <a:gsLst>
+              <a:gs pos="0">
+                <a:schemeClr val="accent1">
+                  <a:lumMod val="60000"/>
+                  <a:lumOff val="40000"/>
+                </a:schemeClr>
+              </a:gs>
+              <a:gs pos="65000">
+                <a:srgbClr val="00B0F0"/>
+              </a:gs>
+            </a:gsLst>
+            <a:path path="circle">
+              <a:fillToRect l="50000" t="50000" r="50000" b="50000"/>
+            </a:path>
+            <a:tileRect/>
+          </a:gradFill>
+          <a:ln>
+            <a:noFill/>
+          </a:ln>
+        </p:spPr>
+        <p:style>
+          <a:lnRef idx="2">
+            <a:schemeClr val="accent1">
+              <a:shade val="50000"/>
+            </a:schemeClr>
+          </a:lnRef>
+          <a:fillRef idx="1">
+            <a:schemeClr val="accent1"/>
+          </a:fillRef>
+          <a:effectRef idx="0">
+            <a:schemeClr val="accent1"/>
+          </a:effectRef>
+          <a:fontRef idx="minor">
+            <a:schemeClr val="lt1"/>
+          </a:fontRef>
+        </p:style>
+        <p:txBody>
+          <a:bodyPr rtlCol="0" anchor="ctr"/>
+          <a:lstStyle/>
+          <a:p>
+            <a:pPr algn="ctr"/>
+            <a:endParaRPr lang="zh-CN" altLang="en-US"/>
+          </a:p>
+        </p:txBody>
+      </p:sp>
+      <p:sp>
+        <p:nvSpPr>
+          <p:cNvPr id="5" name="TextBox 4"/>
+          <p:cNvSpPr txBox="1"/>
+          <p:nvPr/>
+        </p:nvSpPr>
+        <p:spPr>
+          <a:xfrm>
+            <a:off x="2699792" y="2708920"/>
+            <a:ext cx="3600400" cy="523220"/>
+          </a:xfrm>
+          <a:prstGeom prst="rect">
+            <a:avLst/>
+          </a:prstGeom>
+          <a:noFill/>
+        </p:spPr>
+        <p:txBody>
+          <a:bodyPr wrap="square" rtlCol="0">
+            <a:spAutoFit/>
+          </a:bodyPr>
+          <a:lstStyle/>
+          <a:p>
+            <a:pPr algn="ctr"/>
+            <a:r>
+              <a:rPr lang="zh-CN" altLang="en-US" sz="2800" b="1" smtClean="0">
+                <a:solidFill>
+                  <a:schemeClr val="bg1"/>
+                </a:solidFill>
+                <a:latin typeface="微软雅黑" pitchFamily="34" charset="-122"/>
+                <a:ea typeface="微软雅黑" pitchFamily="34" charset="-122"/>
+              </a:rPr>
+              <a:t>微新闻</a:t>
+            </a:r>
+            <a:endParaRPr lang="zh-CN" altLang="en-US" sz="2800" b="1">
+              <a:solidFill>
+                <a:schemeClr val="bg1"/>
+              </a:solidFill>
+              <a:latin typeface="微软雅黑" pitchFamily="34" charset="-122"/>
+              <a:ea typeface="微软雅黑" pitchFamily="34" charset="-122"/>
+            </a:endParaRPr>
+          </a:p>
+        </p:txBody>
+      </p:sp>
+      <p:sp>
+        <p:nvSpPr>
+          <p:cNvPr id="6" name="TextBox 5"/>
+          <p:cNvSpPr txBox="1"/>
+          <p:nvPr/>
+        </p:nvSpPr>
+        <p:spPr>
+          <a:xfrm>
+            <a:off x="2699792" y="3306470"/>
+            <a:ext cx="3600400" cy="338554"/>
+          </a:xfrm>
+          <a:prstGeom prst="rect">
+            <a:avLst/>
+          </a:prstGeom>
+          <a:noFill/>
+        </p:spPr>
+        <p:txBody>
+          <a:bodyPr wrap="square" rtlCol="0">
+            <a:spAutoFit/>
+          </a:bodyPr>
+          <a:lstStyle/>
+          <a:p>
+            <a:pPr algn="ctr"/>
+            <a:r>
+              <a:rPr lang="zh-CN" altLang="en-US" sz="1600" b="1" smtClean="0">
+                <a:solidFill>
+                  <a:schemeClr val="bg1"/>
+                </a:solidFill>
+                <a:latin typeface="幼圆" pitchFamily="49" charset="-122"/>
+                <a:ea typeface="幼圆" pitchFamily="49" charset="-122"/>
+              </a:rPr>
+              <a:t>拾起我们的碎片时间</a:t>
+            </a:r>
+            <a:endParaRPr lang="zh-CN" altLang="en-US" sz="1600" b="1">
+              <a:solidFill>
+                <a:schemeClr val="bg1"/>
+              </a:solidFill>
+              <a:latin typeface="幼圆" pitchFamily="49" charset="-122"/>
+              <a:ea typeface="幼圆" pitchFamily="49" charset="-122"/>
+            </a:endParaRPr>
+          </a:p>
+        </p:txBody>
+      </p:sp>
+    </p:spTree>
+  </p:cSld>
+  <p:clrMapOvr>
+    <a:masterClrMapping/>
+  </p:clrMapOvr>
+</p:sld>
+</file>
+
+<file path=ppt/slides/slide4.xml><?xml version="1.0" encoding="utf-8"?>
+<p:sld xmlns:a="http://schemas.openxmlformats.org/drawingml/2006/main" xmlns:r="http://schemas.openxmlformats.org/officeDocument/2006/relationships" xmlns:p="http://schemas.openxmlformats.org/presentationml/2006/main">
+  <p:cSld>
+    <p:spTree>
+      <p:nvGrpSpPr>
+        <p:cNvPr id="1" name=""/>
+        <p:cNvGrpSpPr/>
+        <p:nvPr/>
+      </p:nvGrpSpPr>
+      <p:grpSpPr>
+        <a:xfrm>
+          <a:off x="0" y="0"/>
+          <a:ext cx="0" cy="0"/>
+          <a:chOff x="0" y="0"/>
+          <a:chExt cx="0" cy="0"/>
+        </a:xfrm>
+      </p:grpSpPr>
+      <p:sp>
+        <p:nvSpPr>
+          <p:cNvPr id="2" name="圆角矩形 1"/>
+          <p:cNvSpPr/>
+          <p:nvPr/>
+        </p:nvSpPr>
+        <p:spPr>
+          <a:xfrm>
+            <a:off x="683568" y="908720"/>
+            <a:ext cx="3168352" cy="3168352"/>
+          </a:xfrm>
+          <a:prstGeom prst="roundRect">
+            <a:avLst/>
+          </a:prstGeom>
+          <a:gradFill flip="none" rotWithShape="1">
+            <a:gsLst>
+              <a:gs pos="0">
+                <a:schemeClr val="accent1">
+                  <a:lumMod val="60000"/>
+                  <a:lumOff val="40000"/>
+                </a:schemeClr>
+              </a:gs>
+              <a:gs pos="77000">
+                <a:srgbClr val="00B0F0"/>
+              </a:gs>
+            </a:gsLst>
+            <a:path path="circle">
+              <a:fillToRect l="50000" t="50000" r="50000" b="50000"/>
+            </a:path>
+            <a:tileRect/>
+          </a:gradFill>
+          <a:ln>
+            <a:noFill/>
+          </a:ln>
+          <a:effectLst/>
+          <a:scene3d>
+            <a:camera prst="orthographicFront">
+              <a:rot lat="0" lon="0" rev="0"/>
+            </a:camera>
+            <a:lightRig rig="contrasting" dir="t">
+              <a:rot lat="0" lon="0" rev="7800000"/>
+            </a:lightRig>
+          </a:scene3d>
+          <a:sp3d>
+            <a:bevelT w="139700" h="139700"/>
+          </a:sp3d>
+        </p:spPr>
+        <p:style>
+          <a:lnRef idx="2">
+            <a:schemeClr val="accent1">
+              <a:shade val="50000"/>
+            </a:schemeClr>
+          </a:lnRef>
+          <a:fillRef idx="1">
+            <a:schemeClr val="accent1"/>
+          </a:fillRef>
+          <a:effectRef idx="0">
+            <a:schemeClr val="accent1"/>
+          </a:effectRef>
+          <a:fontRef idx="minor">
+            <a:schemeClr val="lt1"/>
+          </a:fontRef>
+        </p:style>
+        <p:txBody>
+          <a:bodyPr rtlCol="0" anchor="ctr"/>
+          <a:lstStyle/>
+          <a:p>
+            <a:pPr algn="ctr"/>
+            <a:r>
+              <a:rPr lang="zh-CN" altLang="en-US" sz="6600" b="1" smtClean="0">
+                <a:latin typeface="幼圆" pitchFamily="49" charset="-122"/>
+                <a:ea typeface="幼圆" pitchFamily="49" charset="-122"/>
+              </a:rPr>
+              <a:t>微新闻</a:t>
+            </a:r>
+            <a:endParaRPr lang="zh-CN" altLang="en-US" sz="6600" b="1">
+              <a:latin typeface="幼圆" pitchFamily="49" charset="-122"/>
+              <a:ea typeface="幼圆" pitchFamily="49" charset="-122"/>
+            </a:endParaRPr>
+          </a:p>
+        </p:txBody>
+      </p:sp>
       <p:grpSp>
         <p:nvGrpSpPr>
-          <p:cNvPr id="7" name="组合 6"/>
+          <p:cNvPr id="5" name="组合 4"/>
           <p:cNvGrpSpPr/>
           <p:nvPr/>
         </p:nvGrpSpPr>
         <p:grpSpPr>
           <a:xfrm>
-            <a:off x="2699792" y="164637"/>
-            <a:ext cx="3600400" cy="6000667"/>
-            <a:chOff x="2699792" y="164637"/>
-            <a:chExt cx="3600400" cy="6000667"/>
+            <a:off x="5580112" y="980728"/>
+            <a:ext cx="3168352" cy="3168352"/>
+            <a:chOff x="5580112" y="980728"/>
+            <a:chExt cx="3168352" cy="3168352"/>
           </a:xfrm>
         </p:grpSpPr>
         <p:sp>
           <p:nvSpPr>
-            <p:cNvPr id="4" name="矩形 3"/>
+            <p:cNvPr id="3" name="圆角矩形 2"/>
             <p:cNvSpPr/>
             <p:nvPr/>
           </p:nvSpPr>
           <p:spPr>
             <a:xfrm>
-              <a:off x="2699792" y="164637"/>
-              <a:ext cx="3600400" cy="6000667"/>
+              <a:off x="5580112" y="980728"/>
+              <a:ext cx="3168352" cy="3168352"/>
             </a:xfrm>
-            <a:prstGeom prst="rect">
+            <a:prstGeom prst="roundRect">
               <a:avLst/>
             </a:prstGeom>
             <a:gradFill flip="none" rotWithShape="1">
@@ -3240,7 +3675,7 @@
                     <a:lumOff val="40000"/>
                   </a:schemeClr>
                 </a:gs>
-                <a:gs pos="65000">
+                <a:gs pos="77000">
                   <a:srgbClr val="00B0F0"/>
                 </a:gs>
               </a:gsLst>
@@ -3249,6 +3684,496 @@
               </a:path>
               <a:tileRect/>
             </a:gradFill>
+            <a:ln>
+              <a:noFill/>
+            </a:ln>
+            <a:effectLst/>
+            <a:scene3d>
+              <a:camera prst="orthographicFront">
+                <a:rot lat="0" lon="0" rev="0"/>
+              </a:camera>
+              <a:lightRig rig="contrasting" dir="t">
+                <a:rot lat="0" lon="0" rev="7800000"/>
+              </a:lightRig>
+            </a:scene3d>
+            <a:sp3d>
+              <a:bevelT w="139700" h="139700"/>
+            </a:sp3d>
+          </p:spPr>
+          <p:style>
+            <a:lnRef idx="2">
+              <a:schemeClr val="accent1">
+                <a:shade val="50000"/>
+              </a:schemeClr>
+            </a:lnRef>
+            <a:fillRef idx="1">
+              <a:schemeClr val="accent1"/>
+            </a:fillRef>
+            <a:effectRef idx="0">
+              <a:schemeClr val="accent1"/>
+            </a:effectRef>
+            <a:fontRef idx="minor">
+              <a:schemeClr val="lt1"/>
+            </a:fontRef>
+          </p:style>
+          <p:txBody>
+            <a:bodyPr rtlCol="0" anchor="ctr"/>
+            <a:lstStyle/>
+            <a:p>
+              <a:pPr algn="ctr"/>
+              <a:endParaRPr lang="zh-CN" altLang="en-US" sz="9600" b="1">
+                <a:latin typeface="Arial Unicode MS" pitchFamily="34" charset="-122"/>
+                <a:ea typeface="Arial Unicode MS" pitchFamily="34" charset="-122"/>
+                <a:cs typeface="Arial Unicode MS" pitchFamily="34" charset="-122"/>
+              </a:endParaRPr>
+            </a:p>
+          </p:txBody>
+        </p:sp>
+        <p:sp>
+          <p:nvSpPr>
+            <p:cNvPr id="4" name="TextBox 3"/>
+            <p:cNvSpPr txBox="1"/>
+            <p:nvPr/>
+          </p:nvSpPr>
+          <p:spPr>
+            <a:xfrm>
+              <a:off x="5724128" y="994370"/>
+              <a:ext cx="2880320" cy="3154710"/>
+            </a:xfrm>
+            <a:prstGeom prst="rect">
+              <a:avLst/>
+            </a:prstGeom>
+            <a:noFill/>
+          </p:spPr>
+          <p:txBody>
+            <a:bodyPr wrap="square" rtlCol="0">
+              <a:spAutoFit/>
+            </a:bodyPr>
+            <a:lstStyle/>
+            <a:p>
+              <a:pPr algn="ctr"/>
+              <a:r>
+                <a:rPr lang="en-US" altLang="zh-CN" sz="19900" b="1" smtClean="0">
+                  <a:solidFill>
+                    <a:schemeClr val="bg1"/>
+                  </a:solidFill>
+                  <a:latin typeface="Verdana" pitchFamily="34" charset="0"/>
+                  <a:ea typeface="Verdana" pitchFamily="34" charset="0"/>
+                  <a:cs typeface="Verdana" pitchFamily="34" charset="0"/>
+                </a:rPr>
+                <a:t>V</a:t>
+              </a:r>
+              <a:endParaRPr lang="zh-CN" altLang="en-US" sz="19900" b="1">
+                <a:solidFill>
+                  <a:schemeClr val="bg1"/>
+                </a:solidFill>
+                <a:latin typeface="Verdana" pitchFamily="34" charset="0"/>
+                <a:cs typeface="Verdana" pitchFamily="34" charset="0"/>
+              </a:endParaRPr>
+            </a:p>
+          </p:txBody>
+        </p:sp>
+      </p:grpSp>
+    </p:spTree>
+  </p:cSld>
+  <p:clrMapOvr>
+    <a:masterClrMapping/>
+  </p:clrMapOvr>
+</p:sld>
+</file>
+
+<file path=ppt/slides/slide5.xml><?xml version="1.0" encoding="utf-8"?>
+<p:sld xmlns:a="http://schemas.openxmlformats.org/drawingml/2006/main" xmlns:r="http://schemas.openxmlformats.org/officeDocument/2006/relationships" xmlns:p="http://schemas.openxmlformats.org/presentationml/2006/main">
+  <p:cSld>
+    <p:spTree>
+      <p:nvGrpSpPr>
+        <p:cNvPr id="1" name=""/>
+        <p:cNvGrpSpPr/>
+        <p:nvPr/>
+      </p:nvGrpSpPr>
+      <p:grpSpPr>
+        <a:xfrm>
+          <a:off x="0" y="0"/>
+          <a:ext cx="0" cy="0"/>
+          <a:chOff x="0" y="0"/>
+          <a:chExt cx="0" cy="0"/>
+        </a:xfrm>
+      </p:grpSpPr>
+      <p:grpSp>
+        <p:nvGrpSpPr>
+          <p:cNvPr id="5" name="组合 4"/>
+          <p:cNvGrpSpPr/>
+          <p:nvPr/>
+        </p:nvGrpSpPr>
+        <p:grpSpPr>
+          <a:xfrm>
+            <a:off x="2699792" y="980728"/>
+            <a:ext cx="3168352" cy="3168352"/>
+            <a:chOff x="5580112" y="980728"/>
+            <a:chExt cx="3168352" cy="3168352"/>
+          </a:xfrm>
+        </p:grpSpPr>
+        <p:sp>
+          <p:nvSpPr>
+            <p:cNvPr id="3" name="圆角矩形 2"/>
+            <p:cNvSpPr/>
+            <p:nvPr/>
+          </p:nvSpPr>
+          <p:spPr>
+            <a:xfrm>
+              <a:off x="5580112" y="980728"/>
+              <a:ext cx="3168352" cy="3168352"/>
+            </a:xfrm>
+            <a:prstGeom prst="roundRect">
+              <a:avLst/>
+            </a:prstGeom>
+            <a:gradFill flip="none" rotWithShape="1">
+              <a:gsLst>
+                <a:gs pos="0">
+                  <a:schemeClr val="accent1">
+                    <a:lumMod val="60000"/>
+                    <a:lumOff val="40000"/>
+                  </a:schemeClr>
+                </a:gs>
+                <a:gs pos="77000">
+                  <a:srgbClr val="00B0F0"/>
+                </a:gs>
+              </a:gsLst>
+              <a:path path="circle">
+                <a:fillToRect l="50000" t="50000" r="50000" b="50000"/>
+              </a:path>
+              <a:tileRect/>
+            </a:gradFill>
+            <a:ln>
+              <a:noFill/>
+            </a:ln>
+            <a:effectLst/>
+            <a:scene3d>
+              <a:camera prst="orthographicFront">
+                <a:rot lat="0" lon="0" rev="0"/>
+              </a:camera>
+              <a:lightRig rig="contrasting" dir="t">
+                <a:rot lat="0" lon="0" rev="7800000"/>
+              </a:lightRig>
+            </a:scene3d>
+            <a:sp3d>
+              <a:bevelT w="139700" h="139700"/>
+            </a:sp3d>
+          </p:spPr>
+          <p:style>
+            <a:lnRef idx="2">
+              <a:schemeClr val="accent1">
+                <a:shade val="50000"/>
+              </a:schemeClr>
+            </a:lnRef>
+            <a:fillRef idx="1">
+              <a:schemeClr val="accent1"/>
+            </a:fillRef>
+            <a:effectRef idx="0">
+              <a:schemeClr val="accent1"/>
+            </a:effectRef>
+            <a:fontRef idx="minor">
+              <a:schemeClr val="lt1"/>
+            </a:fontRef>
+          </p:style>
+          <p:txBody>
+            <a:bodyPr rtlCol="0" anchor="ctr"/>
+            <a:lstStyle/>
+            <a:p>
+              <a:pPr algn="ctr"/>
+              <a:endParaRPr lang="zh-CN" altLang="en-US" sz="9600" b="1">
+                <a:latin typeface="Arial Unicode MS" pitchFamily="34" charset="-122"/>
+                <a:ea typeface="Arial Unicode MS" pitchFamily="34" charset="-122"/>
+                <a:cs typeface="Arial Unicode MS" pitchFamily="34" charset="-122"/>
+              </a:endParaRPr>
+            </a:p>
+          </p:txBody>
+        </p:sp>
+        <p:sp>
+          <p:nvSpPr>
+            <p:cNvPr id="4" name="TextBox 3"/>
+            <p:cNvSpPr txBox="1"/>
+            <p:nvPr/>
+          </p:nvSpPr>
+          <p:spPr>
+            <a:xfrm>
+              <a:off x="5724128" y="994370"/>
+              <a:ext cx="2880320" cy="3154710"/>
+            </a:xfrm>
+            <a:prstGeom prst="rect">
+              <a:avLst/>
+            </a:prstGeom>
+            <a:noFill/>
+          </p:spPr>
+          <p:txBody>
+            <a:bodyPr wrap="square" rtlCol="0">
+              <a:spAutoFit/>
+            </a:bodyPr>
+            <a:lstStyle/>
+            <a:p>
+              <a:pPr algn="ctr"/>
+              <a:r>
+                <a:rPr lang="en-US" altLang="zh-CN" sz="19900" b="1" smtClean="0">
+                  <a:solidFill>
+                    <a:schemeClr val="bg1"/>
+                  </a:solidFill>
+                  <a:latin typeface="Verdana" pitchFamily="34" charset="0"/>
+                  <a:ea typeface="Verdana" pitchFamily="34" charset="0"/>
+                  <a:cs typeface="Verdana" pitchFamily="34" charset="0"/>
+                </a:rPr>
+                <a:t>V</a:t>
+              </a:r>
+              <a:endParaRPr lang="zh-CN" altLang="en-US" sz="19900" b="1">
+                <a:solidFill>
+                  <a:schemeClr val="bg1"/>
+                </a:solidFill>
+                <a:latin typeface="Verdana" pitchFamily="34" charset="0"/>
+                <a:cs typeface="Verdana" pitchFamily="34" charset="0"/>
+              </a:endParaRPr>
+            </a:p>
+          </p:txBody>
+        </p:sp>
+      </p:grpSp>
+    </p:spTree>
+  </p:cSld>
+  <p:clrMapOvr>
+    <a:masterClrMapping/>
+  </p:clrMapOvr>
+</p:sld>
+</file>
+
+<file path=ppt/slides/slide6.xml><?xml version="1.0" encoding="utf-8"?>
+<p:sld xmlns:a="http://schemas.openxmlformats.org/drawingml/2006/main" xmlns:r="http://schemas.openxmlformats.org/officeDocument/2006/relationships" xmlns:p="http://schemas.openxmlformats.org/presentationml/2006/main">
+  <p:cSld>
+    <p:bg>
+      <p:bgPr>
+        <a:solidFill>
+          <a:schemeClr val="tx1">
+            <a:lumMod val="85000"/>
+            <a:lumOff val="15000"/>
+          </a:schemeClr>
+        </a:solidFill>
+        <a:effectLst/>
+      </p:bgPr>
+    </p:bg>
+    <p:spTree>
+      <p:nvGrpSpPr>
+        <p:cNvPr id="1" name=""/>
+        <p:cNvGrpSpPr/>
+        <p:nvPr/>
+      </p:nvGrpSpPr>
+      <p:grpSpPr>
+        <a:xfrm>
+          <a:off x="0" y="0"/>
+          <a:ext cx="0" cy="0"/>
+          <a:chOff x="0" y="0"/>
+          <a:chExt cx="0" cy="0"/>
+        </a:xfrm>
+      </p:grpSpPr>
+      <p:sp>
+        <p:nvSpPr>
+          <p:cNvPr id="2" name="圆角矩形 1"/>
+          <p:cNvSpPr/>
+          <p:nvPr/>
+        </p:nvSpPr>
+        <p:spPr>
+          <a:xfrm>
+            <a:off x="251520" y="188640"/>
+            <a:ext cx="3168352" cy="3168352"/>
+          </a:xfrm>
+          <a:prstGeom prst="roundRect">
+            <a:avLst/>
+          </a:prstGeom>
+          <a:gradFill flip="none" rotWithShape="1">
+            <a:gsLst>
+              <a:gs pos="0">
+                <a:schemeClr val="accent1">
+                  <a:lumMod val="60000"/>
+                  <a:lumOff val="40000"/>
+                </a:schemeClr>
+              </a:gs>
+              <a:gs pos="77000">
+                <a:srgbClr val="00B0F0"/>
+              </a:gs>
+            </a:gsLst>
+            <a:path path="circle">
+              <a:fillToRect l="50000" t="50000" r="50000" b="50000"/>
+            </a:path>
+            <a:tileRect/>
+          </a:gradFill>
+          <a:ln>
+            <a:noFill/>
+          </a:ln>
+          <a:effectLst/>
+          <a:scene3d>
+            <a:camera prst="orthographicFront">
+              <a:rot lat="0" lon="0" rev="0"/>
+            </a:camera>
+            <a:lightRig rig="contrasting" dir="t">
+              <a:rot lat="0" lon="0" rev="7800000"/>
+            </a:lightRig>
+          </a:scene3d>
+          <a:sp3d>
+            <a:bevelT w="139700" h="139700" prst="angle"/>
+          </a:sp3d>
+        </p:spPr>
+        <p:style>
+          <a:lnRef idx="2">
+            <a:schemeClr val="accent1">
+              <a:shade val="50000"/>
+            </a:schemeClr>
+          </a:lnRef>
+          <a:fillRef idx="1">
+            <a:schemeClr val="accent1"/>
+          </a:fillRef>
+          <a:effectRef idx="0">
+            <a:schemeClr val="accent1"/>
+          </a:effectRef>
+          <a:fontRef idx="minor">
+            <a:schemeClr val="lt1"/>
+          </a:fontRef>
+        </p:style>
+        <p:txBody>
+          <a:bodyPr rtlCol="0" anchor="ctr"/>
+          <a:lstStyle/>
+          <a:p>
+            <a:pPr algn="ctr"/>
+            <a:r>
+              <a:rPr lang="zh-CN" altLang="en-US" sz="16600" b="1" smtClean="0">
+                <a:latin typeface="幼圆" pitchFamily="49" charset="-122"/>
+                <a:ea typeface="幼圆" pitchFamily="49" charset="-122"/>
+              </a:rPr>
+              <a:t>微</a:t>
+            </a:r>
+            <a:endParaRPr lang="zh-CN" altLang="en-US" sz="16600" b="1">
+              <a:latin typeface="幼圆" pitchFamily="49" charset="-122"/>
+              <a:ea typeface="幼圆" pitchFamily="49" charset="-122"/>
+            </a:endParaRPr>
+          </a:p>
+        </p:txBody>
+      </p:sp>
+      <p:grpSp>
+        <p:nvGrpSpPr>
+          <p:cNvPr id="6" name="组合 5"/>
+          <p:cNvGrpSpPr/>
+          <p:nvPr/>
+        </p:nvGrpSpPr>
+        <p:grpSpPr>
+          <a:xfrm>
+            <a:off x="4499992" y="188640"/>
+            <a:ext cx="3168352" cy="3168352"/>
+            <a:chOff x="4499992" y="188640"/>
+            <a:chExt cx="3168352" cy="3168352"/>
+          </a:xfrm>
+        </p:grpSpPr>
+        <p:sp>
+          <p:nvSpPr>
+            <p:cNvPr id="3" name="圆角矩形 2"/>
+            <p:cNvSpPr/>
+            <p:nvPr/>
+          </p:nvSpPr>
+          <p:spPr>
+            <a:xfrm>
+              <a:off x="4499992" y="188640"/>
+              <a:ext cx="3168352" cy="3168352"/>
+            </a:xfrm>
+            <a:prstGeom prst="roundRect">
+              <a:avLst/>
+            </a:prstGeom>
+            <a:gradFill flip="none" rotWithShape="1">
+              <a:gsLst>
+                <a:gs pos="0">
+                  <a:schemeClr val="accent1">
+                    <a:lumMod val="60000"/>
+                    <a:lumOff val="40000"/>
+                  </a:schemeClr>
+                </a:gs>
+                <a:gs pos="77000">
+                  <a:srgbClr val="00B0F0"/>
+                </a:gs>
+              </a:gsLst>
+              <a:path path="circle">
+                <a:fillToRect l="50000" t="50000" r="50000" b="50000"/>
+              </a:path>
+              <a:tileRect/>
+            </a:gradFill>
+            <a:ln>
+              <a:noFill/>
+            </a:ln>
+            <a:effectLst>
+              <a:outerShdw blurRad="50800" dist="38100" dir="5400000" algn="t" rotWithShape="0">
+                <a:prstClr val="black">
+                  <a:alpha val="40000"/>
+                </a:prstClr>
+              </a:outerShdw>
+            </a:effectLst>
+            <a:scene3d>
+              <a:camera prst="orthographicFront">
+                <a:rot lat="0" lon="0" rev="0"/>
+              </a:camera>
+              <a:lightRig rig="soft" dir="t">
+                <a:rot lat="0" lon="0" rev="0"/>
+              </a:lightRig>
+            </a:scene3d>
+            <a:sp3d contourW="44450" prstMaterial="matte">
+              <a:bevelT w="63500" h="63500" prst="artDeco"/>
+              <a:contourClr>
+                <a:srgbClr val="FFFFFF"/>
+              </a:contourClr>
+            </a:sp3d>
+          </p:spPr>
+          <p:style>
+            <a:lnRef idx="2">
+              <a:schemeClr val="accent1">
+                <a:shade val="50000"/>
+              </a:schemeClr>
+            </a:lnRef>
+            <a:fillRef idx="1">
+              <a:schemeClr val="accent1"/>
+            </a:fillRef>
+            <a:effectRef idx="0">
+              <a:schemeClr val="accent1"/>
+            </a:effectRef>
+            <a:fontRef idx="minor">
+              <a:schemeClr val="lt1"/>
+            </a:fontRef>
+          </p:style>
+          <p:txBody>
+            <a:bodyPr rtlCol="0" anchor="ctr"/>
+            <a:lstStyle/>
+            <a:p>
+              <a:pPr algn="ctr"/>
+              <a:r>
+                <a:rPr lang="en-US" altLang="zh-CN" sz="23900" b="1" smtClean="0">
+                  <a:ea typeface="幼圆" pitchFamily="49" charset="-122"/>
+                </a:rPr>
+                <a:t>V</a:t>
+              </a:r>
+              <a:endParaRPr lang="zh-CN" altLang="en-US" sz="23900" b="1">
+                <a:ea typeface="幼圆" pitchFamily="49" charset="-122"/>
+              </a:endParaRPr>
+            </a:p>
+          </p:txBody>
+        </p:sp>
+        <p:sp>
+          <p:nvSpPr>
+            <p:cNvPr id="4" name="椭圆 3"/>
+            <p:cNvSpPr/>
+            <p:nvPr/>
+          </p:nvSpPr>
+          <p:spPr>
+            <a:xfrm>
+              <a:off x="4788024" y="476672"/>
+              <a:ext cx="2592288" cy="2592288"/>
+            </a:xfrm>
+            <a:prstGeom prst="ellipse">
+              <a:avLst/>
+            </a:prstGeom>
+            <a:solidFill>
+              <a:srgbClr val="3ADCF5">
+                <a:alpha val="16000"/>
+              </a:srgbClr>
+            </a:solidFill>
             <a:ln>
               <a:noFill/>
             </a:ln>
@@ -3278,96 +4203,366 @@
             </a:p>
           </p:txBody>
         </p:sp>
+      </p:grpSp>
+      <p:grpSp>
+        <p:nvGrpSpPr>
+          <p:cNvPr id="8" name="组合 7"/>
+          <p:cNvGrpSpPr/>
+          <p:nvPr/>
+        </p:nvGrpSpPr>
+        <p:grpSpPr>
+          <a:xfrm>
+            <a:off x="4499992" y="3501008"/>
+            <a:ext cx="3168352" cy="3168352"/>
+            <a:chOff x="4499992" y="3501008"/>
+            <a:chExt cx="3168352" cy="3168352"/>
+          </a:xfrm>
+          <a:effectLst>
+            <a:outerShdw blurRad="50800" dist="38100" algn="l" rotWithShape="0">
+              <a:prstClr val="black">
+                <a:alpha val="40000"/>
+              </a:prstClr>
+            </a:outerShdw>
+          </a:effectLst>
+          <a:scene3d>
+            <a:camera prst="orthographicFront">
+              <a:rot lat="0" lon="0" rev="0"/>
+            </a:camera>
+            <a:lightRig rig="soft" dir="t">
+              <a:rot lat="0" lon="0" rev="0"/>
+            </a:lightRig>
+          </a:scene3d>
+        </p:grpSpPr>
         <p:sp>
           <p:nvSpPr>
-            <p:cNvPr id="5" name="TextBox 4"/>
-            <p:cNvSpPr txBox="1"/>
+            <p:cNvPr id="5" name="圆角矩形 4"/>
+            <p:cNvSpPr/>
             <p:nvPr/>
           </p:nvSpPr>
           <p:spPr>
             <a:xfrm>
-              <a:off x="2699792" y="2708920"/>
-              <a:ext cx="3600400" cy="523220"/>
+              <a:off x="4499992" y="3501008"/>
+              <a:ext cx="3168352" cy="3168352"/>
             </a:xfrm>
-            <a:prstGeom prst="rect">
+            <a:prstGeom prst="roundRect">
               <a:avLst/>
             </a:prstGeom>
-            <a:noFill/>
+            <a:gradFill flip="none" rotWithShape="1">
+              <a:gsLst>
+                <a:gs pos="0">
+                  <a:schemeClr val="accent1">
+                    <a:lumMod val="60000"/>
+                    <a:lumOff val="40000"/>
+                  </a:schemeClr>
+                </a:gs>
+                <a:gs pos="77000">
+                  <a:srgbClr val="00B0F0"/>
+                </a:gs>
+              </a:gsLst>
+              <a:path path="circle">
+                <a:fillToRect l="50000" t="50000" r="50000" b="50000"/>
+              </a:path>
+              <a:tileRect/>
+            </a:gradFill>
+            <a:ln>
+              <a:noFill/>
+            </a:ln>
+            <a:effectLst>
+              <a:outerShdw blurRad="107950" dist="12700" dir="5400000" algn="ctr">
+                <a:srgbClr val="000000"/>
+              </a:outerShdw>
+            </a:effectLst>
+            <a:sp3d contourW="44450" prstMaterial="matte">
+              <a:bevelT w="63500" h="63500" prst="artDeco"/>
+              <a:bevelB w="0" h="0"/>
+              <a:contourClr>
+                <a:srgbClr val="FFFFFF"/>
+              </a:contourClr>
+            </a:sp3d>
           </p:spPr>
+          <p:style>
+            <a:lnRef idx="2">
+              <a:schemeClr val="accent1">
+                <a:shade val="50000"/>
+              </a:schemeClr>
+            </a:lnRef>
+            <a:fillRef idx="1">
+              <a:schemeClr val="accent1"/>
+            </a:fillRef>
+            <a:effectRef idx="0">
+              <a:schemeClr val="accent1"/>
+            </a:effectRef>
+            <a:fontRef idx="minor">
+              <a:schemeClr val="lt1"/>
+            </a:fontRef>
+          </p:style>
           <p:txBody>
-            <a:bodyPr wrap="square" rtlCol="0">
-              <a:spAutoFit/>
-            </a:bodyPr>
+            <a:bodyPr rtlCol="0" anchor="ctr"/>
             <a:lstStyle/>
             <a:p>
               <a:pPr algn="ctr"/>
               <a:r>
-                <a:rPr lang="zh-CN" altLang="en-US" sz="2800" b="1" smtClean="0">
-                  <a:solidFill>
-                    <a:schemeClr val="bg1"/>
-                  </a:solidFill>
-                  <a:latin typeface="微软雅黑" pitchFamily="34" charset="-122"/>
-                  <a:ea typeface="微软雅黑" pitchFamily="34" charset="-122"/>
+                <a:rPr lang="zh-CN" altLang="en-US" sz="6600" b="1" smtClean="0">
+                  <a:latin typeface="幼圆" pitchFamily="49" charset="-122"/>
+                  <a:ea typeface="幼圆" pitchFamily="49" charset="-122"/>
                 </a:rPr>
                 <a:t>微新闻</a:t>
               </a:r>
-              <a:endParaRPr lang="zh-CN" altLang="en-US" sz="2800" b="1">
-                <a:solidFill>
-                  <a:schemeClr val="bg1"/>
-                </a:solidFill>
-                <a:latin typeface="微软雅黑" pitchFamily="34" charset="-122"/>
-                <a:ea typeface="微软雅黑" pitchFamily="34" charset="-122"/>
+              <a:endParaRPr lang="zh-CN" altLang="en-US" sz="6600" b="1">
+                <a:latin typeface="幼圆" pitchFamily="49" charset="-122"/>
+                <a:ea typeface="幼圆" pitchFamily="49" charset="-122"/>
               </a:endParaRPr>
             </a:p>
           </p:txBody>
         </p:sp>
         <p:sp>
           <p:nvSpPr>
-            <p:cNvPr id="6" name="TextBox 5"/>
-            <p:cNvSpPr txBox="1"/>
+            <p:cNvPr id="7" name="圆角矩形 6"/>
+            <p:cNvSpPr/>
             <p:nvPr/>
           </p:nvSpPr>
           <p:spPr>
             <a:xfrm>
-              <a:off x="2699792" y="3234462"/>
-              <a:ext cx="3600400" cy="338554"/>
+              <a:off x="4499992" y="3501008"/>
+              <a:ext cx="3168352" cy="3168352"/>
             </a:xfrm>
-            <a:prstGeom prst="rect">
+            <a:prstGeom prst="roundRect">
               <a:avLst/>
             </a:prstGeom>
-            <a:noFill/>
+            <a:gradFill flip="none" rotWithShape="1">
+              <a:gsLst>
+                <a:gs pos="50000">
+                  <a:schemeClr val="bg1">
+                    <a:alpha val="0"/>
+                  </a:schemeClr>
+                </a:gs>
+                <a:gs pos="50000">
+                  <a:srgbClr val="00B0F0">
+                    <a:alpha val="50000"/>
+                  </a:srgbClr>
+                </a:gs>
+              </a:gsLst>
+              <a:lin ang="5400000" scaled="1"/>
+              <a:tileRect/>
+            </a:gradFill>
+            <a:ln>
+              <a:noFill/>
+            </a:ln>
+            <a:effectLst>
+              <a:outerShdw blurRad="107950" dist="12700" dir="5400000" algn="ctr">
+                <a:srgbClr val="000000"/>
+              </a:outerShdw>
+            </a:effectLst>
+            <a:sp3d contourW="44450" prstMaterial="matte">
+              <a:bevelT w="63500" h="63500" prst="artDeco"/>
+              <a:bevelB w="0" h="0"/>
+              <a:contourClr>
+                <a:srgbClr val="FFFFFF"/>
+              </a:contourClr>
+            </a:sp3d>
           </p:spPr>
+          <p:style>
+            <a:lnRef idx="2">
+              <a:schemeClr val="accent1">
+                <a:shade val="50000"/>
+              </a:schemeClr>
+            </a:lnRef>
+            <a:fillRef idx="1">
+              <a:schemeClr val="accent1"/>
+            </a:fillRef>
+            <a:effectRef idx="0">
+              <a:schemeClr val="accent1"/>
+            </a:effectRef>
+            <a:fontRef idx="minor">
+              <a:schemeClr val="lt1"/>
+            </a:fontRef>
+          </p:style>
           <p:txBody>
-            <a:bodyPr wrap="square" rtlCol="0">
-              <a:spAutoFit/>
-            </a:bodyPr>
+            <a:bodyPr rtlCol="0" anchor="ctr"/>
+            <a:lstStyle/>
+            <a:p>
+              <a:pPr algn="ctr"/>
+              <a:endParaRPr lang="zh-CN" altLang="en-US" sz="6600" b="1">
+                <a:latin typeface="幼圆" pitchFamily="49" charset="-122"/>
+                <a:ea typeface="幼圆" pitchFamily="49" charset="-122"/>
+              </a:endParaRPr>
+            </a:p>
+          </p:txBody>
+        </p:sp>
+      </p:grpSp>
+      <p:grpSp>
+        <p:nvGrpSpPr>
+          <p:cNvPr id="13" name="组合 12"/>
+          <p:cNvGrpSpPr/>
+          <p:nvPr/>
+        </p:nvGrpSpPr>
+        <p:grpSpPr>
+          <a:xfrm>
+            <a:off x="323528" y="3501008"/>
+            <a:ext cx="3168352" cy="3168352"/>
+            <a:chOff x="323528" y="3501008"/>
+            <a:chExt cx="3168352" cy="3168352"/>
+          </a:xfrm>
+        </p:grpSpPr>
+        <p:sp>
+          <p:nvSpPr>
+            <p:cNvPr id="10" name="圆角矩形 9"/>
+            <p:cNvSpPr/>
+            <p:nvPr/>
+          </p:nvSpPr>
+          <p:spPr>
+            <a:xfrm>
+              <a:off x="323528" y="3501008"/>
+              <a:ext cx="3168352" cy="3168352"/>
+            </a:xfrm>
+            <a:prstGeom prst="roundRect">
+              <a:avLst/>
+            </a:prstGeom>
+            <a:gradFill flip="none" rotWithShape="1">
+              <a:gsLst>
+                <a:gs pos="0">
+                  <a:schemeClr val="accent1">
+                    <a:lumMod val="60000"/>
+                    <a:lumOff val="40000"/>
+                  </a:schemeClr>
+                </a:gs>
+                <a:gs pos="77000">
+                  <a:srgbClr val="00B0F0"/>
+                </a:gs>
+              </a:gsLst>
+              <a:path path="circle">
+                <a:fillToRect l="50000" t="50000" r="50000" b="50000"/>
+              </a:path>
+              <a:tileRect/>
+            </a:gradFill>
+            <a:ln>
+              <a:noFill/>
+            </a:ln>
+            <a:effectLst>
+              <a:outerShdw blurRad="50800" dist="38100" dir="5400000" algn="t" rotWithShape="0">
+                <a:prstClr val="black">
+                  <a:alpha val="40000"/>
+                </a:prstClr>
+              </a:outerShdw>
+            </a:effectLst>
+            <a:scene3d>
+              <a:camera prst="orthographicFront">
+                <a:rot lat="0" lon="0" rev="0"/>
+              </a:camera>
+              <a:lightRig rig="soft" dir="t">
+                <a:rot lat="0" lon="0" rev="0"/>
+              </a:lightRig>
+            </a:scene3d>
+            <a:sp3d contourW="63500" prstMaterial="softEdge">
+              <a:bevelT w="127000" h="127000" prst="artDeco"/>
+              <a:contourClr>
+                <a:srgbClr val="FFFFFF"/>
+              </a:contourClr>
+            </a:sp3d>
+          </p:spPr>
+          <p:style>
+            <a:lnRef idx="2">
+              <a:schemeClr val="accent1">
+                <a:shade val="50000"/>
+              </a:schemeClr>
+            </a:lnRef>
+            <a:fillRef idx="1">
+              <a:schemeClr val="accent1"/>
+            </a:fillRef>
+            <a:effectRef idx="0">
+              <a:schemeClr val="accent1"/>
+            </a:effectRef>
+            <a:fontRef idx="minor">
+              <a:schemeClr val="lt1"/>
+            </a:fontRef>
+          </p:style>
+          <p:txBody>
+            <a:bodyPr rtlCol="0" anchor="ctr"/>
             <a:lstStyle/>
             <a:p>
               <a:pPr algn="ctr"/>
               <a:r>
-                <a:rPr lang="zh-CN" altLang="en-US" sz="1600" b="1" smtClean="0">
-                  <a:latin typeface="幼圆" pitchFamily="49" charset="-122"/>
+                <a:rPr lang="en-US" altLang="zh-CN" sz="23900" b="1" smtClean="0">
                   <a:ea typeface="幼圆" pitchFamily="49" charset="-122"/>
                 </a:rPr>
-                <a:t>              </a:t>
+                <a:t>V</a:t>
               </a:r>
-              <a:r>
-                <a:rPr lang="zh-CN" altLang="en-US" sz="1600" b="1" smtClean="0">
-                  <a:solidFill>
-                    <a:schemeClr val="bg1"/>
-                  </a:solidFill>
-                  <a:latin typeface="幼圆" pitchFamily="49" charset="-122"/>
-                  <a:ea typeface="幼圆" pitchFamily="49" charset="-122"/>
-                </a:rPr>
-                <a:t>更快地掌握资讯</a:t>
-              </a:r>
-              <a:endParaRPr lang="zh-CN" altLang="en-US" sz="1600" b="1">
-                <a:solidFill>
-                  <a:schemeClr val="bg1"/>
-                </a:solidFill>
-                <a:latin typeface="幼圆" pitchFamily="49" charset="-122"/>
+              <a:endParaRPr lang="zh-CN" altLang="en-US" sz="23900" b="1">
                 <a:ea typeface="幼圆" pitchFamily="49" charset="-122"/>
               </a:endParaRPr>
+            </a:p>
+          </p:txBody>
+        </p:sp>
+        <p:sp>
+          <p:nvSpPr>
+            <p:cNvPr id="11" name="椭圆 10"/>
+            <p:cNvSpPr/>
+            <p:nvPr/>
+          </p:nvSpPr>
+          <p:spPr>
+            <a:xfrm>
+              <a:off x="611560" y="3789040"/>
+              <a:ext cx="2592288" cy="2592288"/>
+            </a:xfrm>
+            <a:prstGeom prst="ellipse">
+              <a:avLst/>
+            </a:prstGeom>
+            <a:gradFill flip="none" rotWithShape="1">
+              <a:gsLst>
+                <a:gs pos="50000">
+                  <a:schemeClr val="accent1">
+                    <a:lumMod val="60000"/>
+                    <a:lumOff val="40000"/>
+                    <a:alpha val="0"/>
+                  </a:schemeClr>
+                </a:gs>
+                <a:gs pos="50000">
+                  <a:srgbClr val="00B0F0">
+                    <a:alpha val="50000"/>
+                  </a:srgbClr>
+                </a:gs>
+              </a:gsLst>
+              <a:lin ang="5400000" scaled="1"/>
+              <a:tileRect/>
+            </a:gradFill>
+            <a:ln>
+              <a:noFill/>
+            </a:ln>
+            <a:effectLst/>
+            <a:scene3d>
+              <a:camera prst="orthographicFront">
+                <a:rot lat="0" lon="0" rev="0"/>
+              </a:camera>
+              <a:lightRig rig="chilly" dir="t">
+                <a:rot lat="0" lon="0" rev="18480000"/>
+              </a:lightRig>
+            </a:scene3d>
+            <a:sp3d prstMaterial="clear">
+              <a:bevelT h="63500"/>
+            </a:sp3d>
+          </p:spPr>
+          <p:style>
+            <a:lnRef idx="2">
+              <a:schemeClr val="accent1">
+                <a:shade val="50000"/>
+              </a:schemeClr>
+            </a:lnRef>
+            <a:fillRef idx="1">
+              <a:schemeClr val="accent1"/>
+            </a:fillRef>
+            <a:effectRef idx="0">
+              <a:schemeClr val="accent1"/>
+            </a:effectRef>
+            <a:fontRef idx="minor">
+              <a:schemeClr val="lt1"/>
+            </a:fontRef>
+          </p:style>
+          <p:txBody>
+            <a:bodyPr rtlCol="0" anchor="ctr"/>
+            <a:lstStyle/>
+            <a:p>
+              <a:pPr algn="ctr"/>
+              <a:endParaRPr lang="zh-CN" altLang="en-US"/>
             </a:p>
           </p:txBody>
         </p:sp>
@@ -3380,7 +4575,7 @@
 </p:sld>
 </file>
 
-<file path=ppt/slides/slide3.xml><?xml version="1.0" encoding="utf-8"?>
+<file path=ppt/slides/slide7.xml><?xml version="1.0" encoding="utf-8"?>
 <p:sld xmlns:a="http://schemas.openxmlformats.org/drawingml/2006/main" xmlns:r="http://schemas.openxmlformats.org/officeDocument/2006/relationships" xmlns:p="http://schemas.openxmlformats.org/presentationml/2006/main">
   <p:cSld>
     <p:bg>
@@ -3510,7 +4705,7 @@
 </p:sld>
 </file>
 
-<file path=ppt/slides/slide4.xml><?xml version="1.0" encoding="utf-8"?>
+<file path=ppt/slides/slide8.xml><?xml version="1.0" encoding="utf-8"?>
 <p:sld xmlns:a="http://schemas.openxmlformats.org/drawingml/2006/main" xmlns:r="http://schemas.openxmlformats.org/officeDocument/2006/relationships" xmlns:p="http://schemas.openxmlformats.org/presentationml/2006/main">
   <p:cSld>
     <p:bg>
@@ -3717,7 +4912,7 @@
 </p:sld>
 </file>
 
-<file path=ppt/slides/slide5.xml><?xml version="1.0" encoding="utf-8"?>
+<file path=ppt/slides/slide9.xml><?xml version="1.0" encoding="utf-8"?>
 <p:sld xmlns:a="http://schemas.openxmlformats.org/drawingml/2006/main" xmlns:r="http://schemas.openxmlformats.org/officeDocument/2006/relationships" xmlns:p="http://schemas.openxmlformats.org/presentationml/2006/main">
   <p:cSld>
     <p:spTree>

</xml_diff>